<commit_message>
A few changes to ppt
</commit_message>
<xml_diff>
--- a/RL Crypto Midterm.pptx
+++ b/RL Crypto Midterm.pptx
@@ -4,16 +4,19 @@
   <p:sldMasterIdLst>
     <p:sldMasterId id="2147483799" r:id="rId1"/>
   </p:sldMasterIdLst>
+  <p:notesMasterIdLst>
+    <p:notesMasterId r:id="rId11"/>
+  </p:notesMasterIdLst>
   <p:sldIdLst>
     <p:sldId id="256" r:id="rId2"/>
     <p:sldId id="257" r:id="rId3"/>
     <p:sldId id="258" r:id="rId4"/>
-    <p:sldId id="260" r:id="rId5"/>
-    <p:sldId id="259" r:id="rId6"/>
-    <p:sldId id="261" r:id="rId7"/>
-    <p:sldId id="263" r:id="rId8"/>
-    <p:sldId id="264" r:id="rId9"/>
-    <p:sldId id="262" r:id="rId10"/>
+    <p:sldId id="259" r:id="rId5"/>
+    <p:sldId id="261" r:id="rId6"/>
+    <p:sldId id="263" r:id="rId7"/>
+    <p:sldId id="264" r:id="rId8"/>
+    <p:sldId id="262" r:id="rId9"/>
+    <p:sldId id="265" r:id="rId10"/>
   </p:sldIdLst>
   <p:sldSz cx="12192000" cy="6858000"/>
   <p:notesSz cx="6858000" cy="9144000"/>
@@ -2982,6 +2985,439 @@
 </dgm:styleDef>
 </file>
 
+<file path=ppt/notesMasters/notesMaster1.xml><?xml version="1.0" encoding="utf-8"?>
+<p:notesMaster xmlns:a="http://schemas.openxmlformats.org/drawingml/2006/main" xmlns:r="http://schemas.openxmlformats.org/officeDocument/2006/relationships" xmlns:p="http://schemas.openxmlformats.org/presentationml/2006/main">
+  <p:cSld>
+    <p:bg>
+      <p:bgRef idx="1001">
+        <a:schemeClr val="bg1"/>
+      </p:bgRef>
+    </p:bg>
+    <p:spTree>
+      <p:nvGrpSpPr>
+        <p:cNvPr id="1" name=""/>
+        <p:cNvGrpSpPr/>
+        <p:nvPr/>
+      </p:nvGrpSpPr>
+      <p:grpSpPr>
+        <a:xfrm>
+          <a:off x="0" y="0"/>
+          <a:ext cx="0" cy="0"/>
+          <a:chOff x="0" y="0"/>
+          <a:chExt cx="0" cy="0"/>
+        </a:xfrm>
+      </p:grpSpPr>
+      <p:sp>
+        <p:nvSpPr>
+          <p:cNvPr id="2" name="Header Placeholder 1"/>
+          <p:cNvSpPr>
+            <a:spLocks noGrp="1"/>
+          </p:cNvSpPr>
+          <p:nvPr>
+            <p:ph type="hdr" sz="quarter"/>
+          </p:nvPr>
+        </p:nvSpPr>
+        <p:spPr>
+          <a:xfrm>
+            <a:off x="0" y="0"/>
+            <a:ext cx="2971800" cy="458788"/>
+          </a:xfrm>
+          <a:prstGeom prst="rect">
+            <a:avLst/>
+          </a:prstGeom>
+        </p:spPr>
+        <p:txBody>
+          <a:bodyPr vert="horz" lIns="91440" tIns="45720" rIns="91440" bIns="45720" rtlCol="0"/>
+          <a:lstStyle>
+            <a:lvl1pPr algn="l">
+              <a:defRPr sz="1200"/>
+            </a:lvl1pPr>
+          </a:lstStyle>
+          <a:p>
+            <a:endParaRPr lang="en-US"/>
+          </a:p>
+        </p:txBody>
+      </p:sp>
+      <p:sp>
+        <p:nvSpPr>
+          <p:cNvPr id="3" name="Date Placeholder 2"/>
+          <p:cNvSpPr>
+            <a:spLocks noGrp="1"/>
+          </p:cNvSpPr>
+          <p:nvPr>
+            <p:ph type="dt" idx="1"/>
+          </p:nvPr>
+        </p:nvSpPr>
+        <p:spPr>
+          <a:xfrm>
+            <a:off x="3884613" y="0"/>
+            <a:ext cx="2971800" cy="458788"/>
+          </a:xfrm>
+          <a:prstGeom prst="rect">
+            <a:avLst/>
+          </a:prstGeom>
+        </p:spPr>
+        <p:txBody>
+          <a:bodyPr vert="horz" lIns="91440" tIns="45720" rIns="91440" bIns="45720" rtlCol="0"/>
+          <a:lstStyle>
+            <a:lvl1pPr algn="r">
+              <a:defRPr sz="1200"/>
+            </a:lvl1pPr>
+          </a:lstStyle>
+          <a:p>
+            <a:fld id="{E3DE979D-38C2-1542-B957-FAD972FD5FD6}" type="datetimeFigureOut">
+              <a:rPr lang="en-US" smtClean="0"/>
+              <a:t>10/27/21</a:t>
+            </a:fld>
+            <a:endParaRPr lang="en-US"/>
+          </a:p>
+        </p:txBody>
+      </p:sp>
+      <p:sp>
+        <p:nvSpPr>
+          <p:cNvPr id="4" name="Slide Image Placeholder 3"/>
+          <p:cNvSpPr>
+            <a:spLocks noGrp="1" noRot="1" noChangeAspect="1"/>
+          </p:cNvSpPr>
+          <p:nvPr>
+            <p:ph type="sldImg" idx="2"/>
+          </p:nvPr>
+        </p:nvSpPr>
+        <p:spPr>
+          <a:xfrm>
+            <a:off x="685800" y="1143000"/>
+            <a:ext cx="5486400" cy="3086100"/>
+          </a:xfrm>
+          <a:prstGeom prst="rect">
+            <a:avLst/>
+          </a:prstGeom>
+          <a:noFill/>
+          <a:ln w="12700">
+            <a:solidFill>
+              <a:prstClr val="black"/>
+            </a:solidFill>
+          </a:ln>
+        </p:spPr>
+        <p:txBody>
+          <a:bodyPr vert="horz" lIns="91440" tIns="45720" rIns="91440" bIns="45720" rtlCol="0" anchor="ctr"/>
+          <a:lstStyle/>
+          <a:p>
+            <a:endParaRPr lang="en-US"/>
+          </a:p>
+        </p:txBody>
+      </p:sp>
+      <p:sp>
+        <p:nvSpPr>
+          <p:cNvPr id="5" name="Notes Placeholder 4"/>
+          <p:cNvSpPr>
+            <a:spLocks noGrp="1"/>
+          </p:cNvSpPr>
+          <p:nvPr>
+            <p:ph type="body" sz="quarter" idx="3"/>
+          </p:nvPr>
+        </p:nvSpPr>
+        <p:spPr>
+          <a:xfrm>
+            <a:off x="685800" y="4400550"/>
+            <a:ext cx="5486400" cy="3600450"/>
+          </a:xfrm>
+          <a:prstGeom prst="rect">
+            <a:avLst/>
+          </a:prstGeom>
+        </p:spPr>
+        <p:txBody>
+          <a:bodyPr vert="horz" lIns="91440" tIns="45720" rIns="91440" bIns="45720" rtlCol="0"/>
+          <a:lstStyle/>
+          <a:p>
+            <a:pPr lvl="0"/>
+            <a:r>
+              <a:rPr lang="en-US"/>
+              <a:t>Click to edit Master text styles</a:t>
+            </a:r>
+          </a:p>
+          <a:p>
+            <a:pPr lvl="1"/>
+            <a:r>
+              <a:rPr lang="en-US"/>
+              <a:t>Second level</a:t>
+            </a:r>
+          </a:p>
+          <a:p>
+            <a:pPr lvl="2"/>
+            <a:r>
+              <a:rPr lang="en-US"/>
+              <a:t>Third level</a:t>
+            </a:r>
+          </a:p>
+          <a:p>
+            <a:pPr lvl="3"/>
+            <a:r>
+              <a:rPr lang="en-US"/>
+              <a:t>Fourth level</a:t>
+            </a:r>
+          </a:p>
+          <a:p>
+            <a:pPr lvl="4"/>
+            <a:r>
+              <a:rPr lang="en-US"/>
+              <a:t>Fifth level</a:t>
+            </a:r>
+          </a:p>
+        </p:txBody>
+      </p:sp>
+      <p:sp>
+        <p:nvSpPr>
+          <p:cNvPr id="6" name="Footer Placeholder 5"/>
+          <p:cNvSpPr>
+            <a:spLocks noGrp="1"/>
+          </p:cNvSpPr>
+          <p:nvPr>
+            <p:ph type="ftr" sz="quarter" idx="4"/>
+          </p:nvPr>
+        </p:nvSpPr>
+        <p:spPr>
+          <a:xfrm>
+            <a:off x="0" y="8685213"/>
+            <a:ext cx="2971800" cy="458787"/>
+          </a:xfrm>
+          <a:prstGeom prst="rect">
+            <a:avLst/>
+          </a:prstGeom>
+        </p:spPr>
+        <p:txBody>
+          <a:bodyPr vert="horz" lIns="91440" tIns="45720" rIns="91440" bIns="45720" rtlCol="0" anchor="b"/>
+          <a:lstStyle>
+            <a:lvl1pPr algn="l">
+              <a:defRPr sz="1200"/>
+            </a:lvl1pPr>
+          </a:lstStyle>
+          <a:p>
+            <a:endParaRPr lang="en-US"/>
+          </a:p>
+        </p:txBody>
+      </p:sp>
+      <p:sp>
+        <p:nvSpPr>
+          <p:cNvPr id="7" name="Slide Number Placeholder 6"/>
+          <p:cNvSpPr>
+            <a:spLocks noGrp="1"/>
+          </p:cNvSpPr>
+          <p:nvPr>
+            <p:ph type="sldNum" sz="quarter" idx="5"/>
+          </p:nvPr>
+        </p:nvSpPr>
+        <p:spPr>
+          <a:xfrm>
+            <a:off x="3884613" y="8685213"/>
+            <a:ext cx="2971800" cy="458787"/>
+          </a:xfrm>
+          <a:prstGeom prst="rect">
+            <a:avLst/>
+          </a:prstGeom>
+        </p:spPr>
+        <p:txBody>
+          <a:bodyPr vert="horz" lIns="91440" tIns="45720" rIns="91440" bIns="45720" rtlCol="0" anchor="b"/>
+          <a:lstStyle>
+            <a:lvl1pPr algn="r">
+              <a:defRPr sz="1200"/>
+            </a:lvl1pPr>
+          </a:lstStyle>
+          <a:p>
+            <a:fld id="{59C79733-3263-B742-A33B-1022655B1E4F}" type="slidenum">
+              <a:rPr lang="en-US" smtClean="0"/>
+              <a:t>‹#›</a:t>
+            </a:fld>
+            <a:endParaRPr lang="en-US"/>
+          </a:p>
+        </p:txBody>
+      </p:sp>
+    </p:spTree>
+    <p:extLst>
+      <p:ext uri="{BB962C8B-B14F-4D97-AF65-F5344CB8AC3E}">
+        <p14:creationId xmlns:p14="http://schemas.microsoft.com/office/powerpoint/2010/main" val="776923798"/>
+      </p:ext>
+    </p:extLst>
+  </p:cSld>
+  <p:clrMap bg1="lt1" tx1="dk1" bg2="lt2" tx2="dk2" accent1="accent1" accent2="accent2" accent3="accent3" accent4="accent4" accent5="accent5" accent6="accent6" hlink="hlink" folHlink="folHlink"/>
+  <p:notesStyle>
+    <a:lvl1pPr marL="0" algn="l" defTabSz="914400" rtl="0" eaLnBrk="1" latinLnBrk="0" hangingPunct="1">
+      <a:defRPr sz="1200" kern="1200">
+        <a:solidFill>
+          <a:schemeClr val="tx1"/>
+        </a:solidFill>
+        <a:latin typeface="+mn-lt"/>
+        <a:ea typeface="+mn-ea"/>
+        <a:cs typeface="+mn-cs"/>
+      </a:defRPr>
+    </a:lvl1pPr>
+    <a:lvl2pPr marL="457200" algn="l" defTabSz="914400" rtl="0" eaLnBrk="1" latinLnBrk="0" hangingPunct="1">
+      <a:defRPr sz="1200" kern="1200">
+        <a:solidFill>
+          <a:schemeClr val="tx1"/>
+        </a:solidFill>
+        <a:latin typeface="+mn-lt"/>
+        <a:ea typeface="+mn-ea"/>
+        <a:cs typeface="+mn-cs"/>
+      </a:defRPr>
+    </a:lvl2pPr>
+    <a:lvl3pPr marL="914400" algn="l" defTabSz="914400" rtl="0" eaLnBrk="1" latinLnBrk="0" hangingPunct="1">
+      <a:defRPr sz="1200" kern="1200">
+        <a:solidFill>
+          <a:schemeClr val="tx1"/>
+        </a:solidFill>
+        <a:latin typeface="+mn-lt"/>
+        <a:ea typeface="+mn-ea"/>
+        <a:cs typeface="+mn-cs"/>
+      </a:defRPr>
+    </a:lvl3pPr>
+    <a:lvl4pPr marL="1371600" algn="l" defTabSz="914400" rtl="0" eaLnBrk="1" latinLnBrk="0" hangingPunct="1">
+      <a:defRPr sz="1200" kern="1200">
+        <a:solidFill>
+          <a:schemeClr val="tx1"/>
+        </a:solidFill>
+        <a:latin typeface="+mn-lt"/>
+        <a:ea typeface="+mn-ea"/>
+        <a:cs typeface="+mn-cs"/>
+      </a:defRPr>
+    </a:lvl4pPr>
+    <a:lvl5pPr marL="1828800" algn="l" defTabSz="914400" rtl="0" eaLnBrk="1" latinLnBrk="0" hangingPunct="1">
+      <a:defRPr sz="1200" kern="1200">
+        <a:solidFill>
+          <a:schemeClr val="tx1"/>
+        </a:solidFill>
+        <a:latin typeface="+mn-lt"/>
+        <a:ea typeface="+mn-ea"/>
+        <a:cs typeface="+mn-cs"/>
+      </a:defRPr>
+    </a:lvl5pPr>
+    <a:lvl6pPr marL="2286000" algn="l" defTabSz="914400" rtl="0" eaLnBrk="1" latinLnBrk="0" hangingPunct="1">
+      <a:defRPr sz="1200" kern="1200">
+        <a:solidFill>
+          <a:schemeClr val="tx1"/>
+        </a:solidFill>
+        <a:latin typeface="+mn-lt"/>
+        <a:ea typeface="+mn-ea"/>
+        <a:cs typeface="+mn-cs"/>
+      </a:defRPr>
+    </a:lvl6pPr>
+    <a:lvl7pPr marL="2743200" algn="l" defTabSz="914400" rtl="0" eaLnBrk="1" latinLnBrk="0" hangingPunct="1">
+      <a:defRPr sz="1200" kern="1200">
+        <a:solidFill>
+          <a:schemeClr val="tx1"/>
+        </a:solidFill>
+        <a:latin typeface="+mn-lt"/>
+        <a:ea typeface="+mn-ea"/>
+        <a:cs typeface="+mn-cs"/>
+      </a:defRPr>
+    </a:lvl7pPr>
+    <a:lvl8pPr marL="3200400" algn="l" defTabSz="914400" rtl="0" eaLnBrk="1" latinLnBrk="0" hangingPunct="1">
+      <a:defRPr sz="1200" kern="1200">
+        <a:solidFill>
+          <a:schemeClr val="tx1"/>
+        </a:solidFill>
+        <a:latin typeface="+mn-lt"/>
+        <a:ea typeface="+mn-ea"/>
+        <a:cs typeface="+mn-cs"/>
+      </a:defRPr>
+    </a:lvl8pPr>
+    <a:lvl9pPr marL="3657600" algn="l" defTabSz="914400" rtl="0" eaLnBrk="1" latinLnBrk="0" hangingPunct="1">
+      <a:defRPr sz="1200" kern="1200">
+        <a:solidFill>
+          <a:schemeClr val="tx1"/>
+        </a:solidFill>
+        <a:latin typeface="+mn-lt"/>
+        <a:ea typeface="+mn-ea"/>
+        <a:cs typeface="+mn-cs"/>
+      </a:defRPr>
+    </a:lvl9pPr>
+  </p:notesStyle>
+</p:notesMaster>
+</file>
+
+<file path=ppt/notesSlides/notesSlide1.xml><?xml version="1.0" encoding="utf-8"?>
+<p:notes xmlns:a="http://schemas.openxmlformats.org/drawingml/2006/main" xmlns:r="http://schemas.openxmlformats.org/officeDocument/2006/relationships" xmlns:p="http://schemas.openxmlformats.org/presentationml/2006/main">
+  <p:cSld>
+    <p:spTree>
+      <p:nvGrpSpPr>
+        <p:cNvPr id="1" name=""/>
+        <p:cNvGrpSpPr/>
+        <p:nvPr/>
+      </p:nvGrpSpPr>
+      <p:grpSpPr>
+        <a:xfrm>
+          <a:off x="0" y="0"/>
+          <a:ext cx="0" cy="0"/>
+          <a:chOff x="0" y="0"/>
+          <a:chExt cx="0" cy="0"/>
+        </a:xfrm>
+      </p:grpSpPr>
+      <p:sp>
+        <p:nvSpPr>
+          <p:cNvPr id="2" name="Slide Image Placeholder 1"/>
+          <p:cNvSpPr>
+            <a:spLocks noGrp="1" noRot="1" noChangeAspect="1"/>
+          </p:cNvSpPr>
+          <p:nvPr>
+            <p:ph type="sldImg"/>
+          </p:nvPr>
+        </p:nvSpPr>
+        <p:spPr/>
+      </p:sp>
+      <p:sp>
+        <p:nvSpPr>
+          <p:cNvPr id="3" name="Notes Placeholder 2"/>
+          <p:cNvSpPr>
+            <a:spLocks noGrp="1"/>
+          </p:cNvSpPr>
+          <p:nvPr>
+            <p:ph type="body" idx="1"/>
+          </p:nvPr>
+        </p:nvSpPr>
+        <p:spPr/>
+        <p:txBody>
+          <a:bodyPr/>
+          <a:lstStyle/>
+          <a:p>
+            <a:endParaRPr lang="en-US" dirty="0"/>
+          </a:p>
+        </p:txBody>
+      </p:sp>
+      <p:sp>
+        <p:nvSpPr>
+          <p:cNvPr id="4" name="Slide Number Placeholder 3"/>
+          <p:cNvSpPr>
+            <a:spLocks noGrp="1"/>
+          </p:cNvSpPr>
+          <p:nvPr>
+            <p:ph type="sldNum" sz="quarter" idx="5"/>
+          </p:nvPr>
+        </p:nvSpPr>
+        <p:spPr/>
+        <p:txBody>
+          <a:bodyPr/>
+          <a:lstStyle/>
+          <a:p>
+            <a:fld id="{59C79733-3263-B742-A33B-1022655B1E4F}" type="slidenum">
+              <a:rPr lang="en-US" smtClean="0"/>
+              <a:t>9</a:t>
+            </a:fld>
+            <a:endParaRPr lang="en-US"/>
+          </a:p>
+        </p:txBody>
+      </p:sp>
+    </p:spTree>
+    <p:extLst>
+      <p:ext uri="{BB962C8B-B14F-4D97-AF65-F5344CB8AC3E}">
+        <p14:creationId xmlns:p14="http://schemas.microsoft.com/office/powerpoint/2010/main" val="1400858409"/>
+      </p:ext>
+    </p:extLst>
+  </p:cSld>
+  <p:clrMapOvr>
+    <a:masterClrMapping/>
+  </p:clrMapOvr>
+</p:notes>
+</file>
+
 <file path=ppt/slideLayouts/slideLayout1.xml><?xml version="1.0" encoding="utf-8"?>
 <p:sldLayout xmlns:a="http://schemas.openxmlformats.org/drawingml/2006/main" xmlns:r="http://schemas.openxmlformats.org/officeDocument/2006/relationships" xmlns:p="http://schemas.openxmlformats.org/presentationml/2006/main" showMasterSp="0" type="title" preserve="1">
   <p:cSld name="Title Slide">
@@ -3403,7 +3839,7 @@
           <a:p>
             <a:fld id="{53BEF823-48A5-43FC-BE03-E79964288B41}" type="datetimeFigureOut">
               <a:rPr lang="en-US" smtClean="0"/>
-              <a:t>10/26/2021</a:t>
+              <a:t>10/27/21</a:t>
             </a:fld>
             <a:endParaRPr lang="en-US" dirty="0"/>
           </a:p>
@@ -3614,7 +4050,7 @@
             <a:fld id="{53BEF823-48A5-43FC-BE03-E79964288B41}" type="datetimeFigureOut">
               <a:rPr lang="en-US" smtClean="0"/>
               <a:pPr algn="r"/>
-              <a:t>10/26/2021</a:t>
+              <a:t>10/27/21</a:t>
             </a:fld>
             <a:endParaRPr lang="en-US" dirty="0"/>
           </a:p>
@@ -3829,7 +4265,7 @@
             <a:fld id="{53BEF823-48A5-43FC-BE03-E79964288B41}" type="datetimeFigureOut">
               <a:rPr lang="en-US" smtClean="0"/>
               <a:pPr algn="r"/>
-              <a:t>10/26/2021</a:t>
+              <a:t>10/27/21</a:t>
             </a:fld>
             <a:endParaRPr lang="en-US" dirty="0"/>
           </a:p>
@@ -4032,7 +4468,7 @@
             <a:fld id="{53BEF823-48A5-43FC-BE03-E79964288B41}" type="datetimeFigureOut">
               <a:rPr lang="en-US" smtClean="0"/>
               <a:pPr algn="r"/>
-              <a:t>10/26/2021</a:t>
+              <a:t>10/27/21</a:t>
             </a:fld>
             <a:endParaRPr lang="en-US" dirty="0"/>
           </a:p>
@@ -4316,7 +4752,7 @@
             <a:fld id="{53BEF823-48A5-43FC-BE03-E79964288B41}" type="datetimeFigureOut">
               <a:rPr lang="en-US" smtClean="0"/>
               <a:pPr algn="r"/>
-              <a:t>10/26/2021</a:t>
+              <a:t>10/27/21</a:t>
             </a:fld>
             <a:endParaRPr lang="en-US" dirty="0"/>
           </a:p>
@@ -4560,7 +4996,7 @@
             <a:fld id="{53BEF823-48A5-43FC-BE03-E79964288B41}" type="datetimeFigureOut">
               <a:rPr lang="en-US" smtClean="0"/>
               <a:pPr algn="r"/>
-              <a:t>10/26/2021</a:t>
+              <a:t>10/27/21</a:t>
             </a:fld>
             <a:endParaRPr lang="en-US" dirty="0"/>
           </a:p>
@@ -5003,7 +5439,7 @@
             <a:fld id="{53BEF823-48A5-43FC-BE03-E79964288B41}" type="datetimeFigureOut">
               <a:rPr lang="en-US" smtClean="0"/>
               <a:pPr algn="r"/>
-              <a:t>10/26/2021</a:t>
+              <a:t>10/27/21</a:t>
             </a:fld>
             <a:endParaRPr lang="en-US" dirty="0"/>
           </a:p>
@@ -5149,7 +5585,7 @@
             <a:fld id="{53BEF823-48A5-43FC-BE03-E79964288B41}" type="datetimeFigureOut">
               <a:rPr lang="en-US" smtClean="0"/>
               <a:pPr algn="r"/>
-              <a:t>10/26/2021</a:t>
+              <a:t>10/27/21</a:t>
             </a:fld>
             <a:endParaRPr lang="en-US" dirty="0"/>
           </a:p>
@@ -5267,7 +5703,7 @@
             <a:fld id="{53BEF823-48A5-43FC-BE03-E79964288B41}" type="datetimeFigureOut">
               <a:rPr lang="en-US" smtClean="0"/>
               <a:pPr algn="r"/>
-              <a:t>10/26/2021</a:t>
+              <a:t>10/27/21</a:t>
             </a:fld>
             <a:endParaRPr lang="en-US" dirty="0"/>
           </a:p>
@@ -5551,7 +5987,7 @@
             <a:fld id="{53BEF823-48A5-43FC-BE03-E79964288B41}" type="datetimeFigureOut">
               <a:rPr lang="en-US" smtClean="0"/>
               <a:pPr algn="r"/>
-              <a:t>10/26/2021</a:t>
+              <a:t>10/27/21</a:t>
             </a:fld>
             <a:endParaRPr lang="en-US" dirty="0"/>
           </a:p>
@@ -5846,7 +6282,7 @@
             <a:fld id="{53BEF823-48A5-43FC-BE03-E79964288B41}" type="datetimeFigureOut">
               <a:rPr lang="en-US" smtClean="0"/>
               <a:pPr algn="r"/>
-              <a:t>10/26/2021</a:t>
+              <a:t>10/27/21</a:t>
             </a:fld>
             <a:endParaRPr lang="en-US" dirty="0"/>
           </a:p>
@@ -6341,7 +6777,7 @@
             <a:fld id="{53BEF823-48A5-43FC-BE03-E79964288B41}" type="datetimeFigureOut">
               <a:rPr lang="en-US" smtClean="0"/>
               <a:pPr algn="r"/>
-              <a:t>10/26/2021</a:t>
+              <a:t>10/27/21</a:t>
             </a:fld>
             <a:endParaRPr lang="en-US" dirty="0"/>
           </a:p>
@@ -8540,430 +8976,6 @@
       </p:sp>
       <p:sp>
         <p:nvSpPr>
-          <p:cNvPr id="10" name="Rectangle 9">
-            <a:extLst>
-              <a:ext uri="{FF2B5EF4-FFF2-40B4-BE49-F238E27FC236}">
-                <a16:creationId xmlns:a16="http://schemas.microsoft.com/office/drawing/2014/main" id="{1CF1AAE4-D0BC-430F-A613-7BBAAECA0C2D}"/>
-              </a:ext>
-              <a:ext uri="{C183D7F6-B498-43B3-948B-1728B52AA6E4}">
-                <adec:decorative xmlns:adec="http://schemas.microsoft.com/office/drawing/2017/decorative" val="1"/>
-              </a:ext>
-            </a:extLst>
-          </p:cNvPr>
-          <p:cNvSpPr>
-            <a:spLocks noGrp="1" noRot="1" noChangeAspect="1" noMove="1" noResize="1" noEditPoints="1" noAdjustHandles="1" noChangeArrowheads="1" noChangeShapeType="1" noTextEdit="1"/>
-          </p:cNvSpPr>
-          <p:nvPr>
-            <p:extLst>
-              <p:ext uri="{386F3935-93C4-4BCD-93E2-E3B085C9AB24}">
-                <p16:designElem xmlns:p16="http://schemas.microsoft.com/office/powerpoint/2015/main" val="1"/>
-              </p:ext>
-            </p:extLst>
-          </p:nvPr>
-        </p:nvSpPr>
-        <p:spPr>
-          <a:xfrm>
-            <a:off x="0" y="0"/>
-            <a:ext cx="12191999" cy="2285999"/>
-          </a:xfrm>
-          <a:prstGeom prst="rect">
-            <a:avLst/>
-          </a:prstGeom>
-          <a:solidFill>
-            <a:schemeClr val="tx1">
-              <a:lumMod val="85000"/>
-              <a:lumOff val="15000"/>
-            </a:schemeClr>
-          </a:solidFill>
-          <a:ln>
-            <a:noFill/>
-          </a:ln>
-        </p:spPr>
-        <p:style>
-          <a:lnRef idx="2">
-            <a:schemeClr val="accent1">
-              <a:shade val="50000"/>
-            </a:schemeClr>
-          </a:lnRef>
-          <a:fillRef idx="1">
-            <a:schemeClr val="accent1"/>
-          </a:fillRef>
-          <a:effectRef idx="0">
-            <a:schemeClr val="accent1"/>
-          </a:effectRef>
-          <a:fontRef idx="minor">
-            <a:schemeClr val="lt1"/>
-          </a:fontRef>
-        </p:style>
-        <p:txBody>
-          <a:bodyPr rtlCol="0" anchor="ctr"/>
-          <a:lstStyle/>
-          <a:p>
-            <a:pPr algn="ctr"/>
-            <a:endParaRPr lang="en-US"/>
-          </a:p>
-        </p:txBody>
-      </p:sp>
-      <p:sp>
-        <p:nvSpPr>
-          <p:cNvPr id="2" name="Title 1">
-            <a:extLst>
-              <a:ext uri="{FF2B5EF4-FFF2-40B4-BE49-F238E27FC236}">
-                <a16:creationId xmlns:a16="http://schemas.microsoft.com/office/drawing/2014/main" id="{D791A2B2-E076-FD4F-8D68-4DD0807AA30B}"/>
-              </a:ext>
-            </a:extLst>
-          </p:cNvPr>
-          <p:cNvSpPr>
-            <a:spLocks noGrp="1"/>
-          </p:cNvSpPr>
-          <p:nvPr>
-            <p:ph type="title"/>
-          </p:nvPr>
-        </p:nvSpPr>
-        <p:spPr>
-          <a:xfrm>
-            <a:off x="758952" y="379475"/>
-            <a:ext cx="10671048" cy="1554480"/>
-          </a:xfrm>
-        </p:spPr>
-        <p:txBody>
-          <a:bodyPr anchor="ctr">
-            <a:normAutofit/>
-          </a:bodyPr>
-          <a:lstStyle/>
-          <a:p>
-            <a:endParaRPr lang="en-US" dirty="0">
-              <a:solidFill>
-                <a:schemeClr val="bg1"/>
-              </a:solidFill>
-            </a:endParaRPr>
-          </a:p>
-        </p:txBody>
-      </p:sp>
-      <p:sp>
-        <p:nvSpPr>
-          <p:cNvPr id="12" name="Freeform 6">
-            <a:extLst>
-              <a:ext uri="{FF2B5EF4-FFF2-40B4-BE49-F238E27FC236}">
-                <a16:creationId xmlns:a16="http://schemas.microsoft.com/office/drawing/2014/main" id="{A101E513-AF74-4E9D-A31F-99664250722D}"/>
-              </a:ext>
-              <a:ext uri="{C183D7F6-B498-43B3-948B-1728B52AA6E4}">
-                <adec:decorative xmlns:adec="http://schemas.microsoft.com/office/drawing/2017/decorative" val="1"/>
-              </a:ext>
-            </a:extLst>
-          </p:cNvPr>
-          <p:cNvSpPr>
-            <a:spLocks noGrp="1" noRot="1" noChangeAspect="1" noMove="1" noResize="1" noEditPoints="1" noAdjustHandles="1" noChangeArrowheads="1" noChangeShapeType="1" noTextEdit="1"/>
-          </p:cNvSpPr>
-          <p:nvPr>
-            <p:extLst>
-              <p:ext uri="{386F3935-93C4-4BCD-93E2-E3B085C9AB24}">
-                <p16:designElem xmlns:p16="http://schemas.microsoft.com/office/powerpoint/2015/main" val="1"/>
-              </p:ext>
-            </p:extLst>
-          </p:nvPr>
-        </p:nvSpPr>
-        <p:spPr bwMode="auto">
-          <a:xfrm>
-            <a:off x="11784011" y="5783564"/>
-            <a:ext cx="407988" cy="819150"/>
-          </a:xfrm>
-          <a:custGeom>
-            <a:avLst/>
-            <a:gdLst/>
-            <a:ahLst/>
-            <a:cxnLst/>
-            <a:rect l="0" t="0" r="r" b="b"/>
-            <a:pathLst>
-              <a:path w="1799" h="3612">
-                <a:moveTo>
-                  <a:pt x="1799" y="0"/>
-                </a:moveTo>
-                <a:lnTo>
-                  <a:pt x="1799" y="3612"/>
-                </a:lnTo>
-                <a:lnTo>
-                  <a:pt x="1686" y="3609"/>
-                </a:lnTo>
-                <a:lnTo>
-                  <a:pt x="1574" y="3598"/>
-                </a:lnTo>
-                <a:lnTo>
-                  <a:pt x="1464" y="3581"/>
-                </a:lnTo>
-                <a:lnTo>
-                  <a:pt x="1357" y="3557"/>
-                </a:lnTo>
-                <a:lnTo>
-                  <a:pt x="1251" y="3527"/>
-                </a:lnTo>
-                <a:lnTo>
-                  <a:pt x="1150" y="3490"/>
-                </a:lnTo>
-                <a:lnTo>
-                  <a:pt x="1050" y="3448"/>
-                </a:lnTo>
-                <a:lnTo>
-                  <a:pt x="953" y="3401"/>
-                </a:lnTo>
-                <a:lnTo>
-                  <a:pt x="860" y="3347"/>
-                </a:lnTo>
-                <a:lnTo>
-                  <a:pt x="771" y="3289"/>
-                </a:lnTo>
-                <a:lnTo>
-                  <a:pt x="686" y="3224"/>
-                </a:lnTo>
-                <a:lnTo>
-                  <a:pt x="604" y="3156"/>
-                </a:lnTo>
-                <a:lnTo>
-                  <a:pt x="527" y="3083"/>
-                </a:lnTo>
-                <a:lnTo>
-                  <a:pt x="454" y="3005"/>
-                </a:lnTo>
-                <a:lnTo>
-                  <a:pt x="386" y="2923"/>
-                </a:lnTo>
-                <a:lnTo>
-                  <a:pt x="323" y="2838"/>
-                </a:lnTo>
-                <a:lnTo>
-                  <a:pt x="265" y="2748"/>
-                </a:lnTo>
-                <a:lnTo>
-                  <a:pt x="211" y="2655"/>
-                </a:lnTo>
-                <a:lnTo>
-                  <a:pt x="163" y="2559"/>
-                </a:lnTo>
-                <a:lnTo>
-                  <a:pt x="121" y="2459"/>
-                </a:lnTo>
-                <a:lnTo>
-                  <a:pt x="85" y="2356"/>
-                </a:lnTo>
-                <a:lnTo>
-                  <a:pt x="55" y="2251"/>
-                </a:lnTo>
-                <a:lnTo>
-                  <a:pt x="32" y="2143"/>
-                </a:lnTo>
-                <a:lnTo>
-                  <a:pt x="14" y="2033"/>
-                </a:lnTo>
-                <a:lnTo>
-                  <a:pt x="4" y="1920"/>
-                </a:lnTo>
-                <a:lnTo>
-                  <a:pt x="0" y="1806"/>
-                </a:lnTo>
-                <a:lnTo>
-                  <a:pt x="4" y="1692"/>
-                </a:lnTo>
-                <a:lnTo>
-                  <a:pt x="14" y="1580"/>
-                </a:lnTo>
-                <a:lnTo>
-                  <a:pt x="32" y="1469"/>
-                </a:lnTo>
-                <a:lnTo>
-                  <a:pt x="55" y="1362"/>
-                </a:lnTo>
-                <a:lnTo>
-                  <a:pt x="85" y="1256"/>
-                </a:lnTo>
-                <a:lnTo>
-                  <a:pt x="121" y="1154"/>
-                </a:lnTo>
-                <a:lnTo>
-                  <a:pt x="163" y="1054"/>
-                </a:lnTo>
-                <a:lnTo>
-                  <a:pt x="211" y="958"/>
-                </a:lnTo>
-                <a:lnTo>
-                  <a:pt x="265" y="864"/>
-                </a:lnTo>
-                <a:lnTo>
-                  <a:pt x="323" y="774"/>
-                </a:lnTo>
-                <a:lnTo>
-                  <a:pt x="386" y="689"/>
-                </a:lnTo>
-                <a:lnTo>
-                  <a:pt x="454" y="607"/>
-                </a:lnTo>
-                <a:lnTo>
-                  <a:pt x="527" y="529"/>
-                </a:lnTo>
-                <a:lnTo>
-                  <a:pt x="604" y="456"/>
-                </a:lnTo>
-                <a:lnTo>
-                  <a:pt x="686" y="388"/>
-                </a:lnTo>
-                <a:lnTo>
-                  <a:pt x="771" y="325"/>
-                </a:lnTo>
-                <a:lnTo>
-                  <a:pt x="860" y="266"/>
-                </a:lnTo>
-                <a:lnTo>
-                  <a:pt x="953" y="212"/>
-                </a:lnTo>
-                <a:lnTo>
-                  <a:pt x="1050" y="164"/>
-                </a:lnTo>
-                <a:lnTo>
-                  <a:pt x="1150" y="122"/>
-                </a:lnTo>
-                <a:lnTo>
-                  <a:pt x="1251" y="85"/>
-                </a:lnTo>
-                <a:lnTo>
-                  <a:pt x="1357" y="55"/>
-                </a:lnTo>
-                <a:lnTo>
-                  <a:pt x="1464" y="32"/>
-                </a:lnTo>
-                <a:lnTo>
-                  <a:pt x="1574" y="14"/>
-                </a:lnTo>
-                <a:lnTo>
-                  <a:pt x="1686" y="5"/>
-                </a:lnTo>
-                <a:lnTo>
-                  <a:pt x="1799" y="0"/>
-                </a:lnTo>
-                <a:close/>
-              </a:path>
-            </a:pathLst>
-          </a:custGeom>
-          <a:solidFill>
-            <a:schemeClr val="tx1">
-              <a:lumMod val="85000"/>
-              <a:lumOff val="15000"/>
-            </a:schemeClr>
-          </a:solidFill>
-          <a:ln w="0">
-            <a:noFill/>
-            <a:prstDash val="solid"/>
-            <a:round/>
-            <a:headEnd/>
-            <a:tailEnd/>
-          </a:ln>
-        </p:spPr>
-        <p:txBody>
-          <a:bodyPr anchor="ctr"/>
-          <a:lstStyle/>
-          <a:p>
-            <a:endParaRPr lang="en-US"/>
-          </a:p>
-        </p:txBody>
-      </p:sp>
-    </p:spTree>
-    <p:extLst>
-      <p:ext uri="{BB962C8B-B14F-4D97-AF65-F5344CB8AC3E}">
-        <p14:creationId xmlns:p14="http://schemas.microsoft.com/office/powerpoint/2010/main" val="1582853892"/>
-      </p:ext>
-    </p:extLst>
-  </p:cSld>
-  <p:clrMapOvr>
-    <a:masterClrMapping/>
-  </p:clrMapOvr>
-</p:sld>
-</file>
-
-<file path=ppt/slides/slide5.xml><?xml version="1.0" encoding="utf-8"?>
-<p:sld xmlns:a="http://schemas.openxmlformats.org/drawingml/2006/main" xmlns:r="http://schemas.openxmlformats.org/officeDocument/2006/relationships" xmlns:p="http://schemas.openxmlformats.org/presentationml/2006/main">
-  <p:cSld>
-    <p:bg>
-      <p:bgPr>
-        <a:solidFill>
-          <a:schemeClr val="bg2"/>
-        </a:solidFill>
-        <a:effectLst/>
-      </p:bgPr>
-    </p:bg>
-    <p:spTree>
-      <p:nvGrpSpPr>
-        <p:cNvPr id="1" name=""/>
-        <p:cNvGrpSpPr/>
-        <p:nvPr/>
-      </p:nvGrpSpPr>
-      <p:grpSpPr>
-        <a:xfrm>
-          <a:off x="0" y="0"/>
-          <a:ext cx="0" cy="0"/>
-          <a:chOff x="0" y="0"/>
-          <a:chExt cx="0" cy="0"/>
-        </a:xfrm>
-      </p:grpSpPr>
-      <p:sp useBgFill="1">
-        <p:nvSpPr>
-          <p:cNvPr id="8" name="Rectangle 7">
-            <a:extLst>
-              <a:ext uri="{FF2B5EF4-FFF2-40B4-BE49-F238E27FC236}">
-                <a16:creationId xmlns:a16="http://schemas.microsoft.com/office/drawing/2014/main" id="{C5176844-69C3-4F79-BE38-EA5BDDF4FEA4}"/>
-              </a:ext>
-              <a:ext uri="{C183D7F6-B498-43B3-948B-1728B52AA6E4}">
-                <adec:decorative xmlns:adec="http://schemas.microsoft.com/office/drawing/2017/decorative" val="1"/>
-              </a:ext>
-            </a:extLst>
-          </p:cNvPr>
-          <p:cNvSpPr>
-            <a:spLocks noGrp="1" noRot="1" noChangeAspect="1" noMove="1" noResize="1" noEditPoints="1" noAdjustHandles="1" noChangeArrowheads="1" noChangeShapeType="1" noTextEdit="1"/>
-          </p:cNvSpPr>
-          <p:nvPr>
-            <p:extLst>
-              <p:ext uri="{386F3935-93C4-4BCD-93E2-E3B085C9AB24}">
-                <p16:designElem xmlns:p16="http://schemas.microsoft.com/office/powerpoint/2015/main" val="1"/>
-              </p:ext>
-            </p:extLst>
-          </p:nvPr>
-        </p:nvSpPr>
-        <p:spPr>
-          <a:xfrm>
-            <a:off x="0" y="0"/>
-            <a:ext cx="12192000" cy="6858000"/>
-          </a:xfrm>
-          <a:prstGeom prst="rect">
-            <a:avLst/>
-          </a:prstGeom>
-          <a:ln>
-            <a:noFill/>
-          </a:ln>
-        </p:spPr>
-        <p:style>
-          <a:lnRef idx="2">
-            <a:schemeClr val="accent1">
-              <a:shade val="50000"/>
-            </a:schemeClr>
-          </a:lnRef>
-          <a:fillRef idx="1">
-            <a:schemeClr val="accent1"/>
-          </a:fillRef>
-          <a:effectRef idx="0">
-            <a:schemeClr val="accent1"/>
-          </a:effectRef>
-          <a:fontRef idx="minor">
-            <a:schemeClr val="lt1"/>
-          </a:fontRef>
-        </p:style>
-        <p:txBody>
-          <a:bodyPr rtlCol="0" anchor="ctr"/>
-          <a:lstStyle/>
-          <a:p>
-            <a:pPr algn="ctr"/>
-            <a:endParaRPr lang="en-US"/>
-          </a:p>
-        </p:txBody>
-      </p:sp>
-      <p:sp>
-        <p:nvSpPr>
           <p:cNvPr id="2" name="Title 1">
             <a:extLst>
               <a:ext uri="{FF2B5EF4-FFF2-40B4-BE49-F238E27FC236}">
@@ -9082,7 +9094,7 @@
           <a:p>
             <a:r>
               <a:rPr lang="en-US" dirty="0"/>
-              <a:t>Monte Carlo</a:t>
+              <a:t>Q-Learning</a:t>
             </a:r>
           </a:p>
           <a:p>
@@ -9094,19 +9106,13 @@
           <a:p>
             <a:r>
               <a:rPr lang="en-US" dirty="0"/>
-              <a:t>Episode will be 10 days</a:t>
+              <a:t>Episode is 60 days</a:t>
             </a:r>
           </a:p>
           <a:p>
             <a:r>
               <a:rPr lang="en-US" dirty="0"/>
-              <a:t>State space is all of the available values of the chosen indicators</a:t>
-            </a:r>
-          </a:p>
-          <a:p>
-            <a:r>
-              <a:rPr lang="en-US" dirty="0"/>
-              <a:t>Training on historical crypto data</a:t>
+              <a:t>State space is the indicators</a:t>
             </a:r>
           </a:p>
           <a:p>
@@ -9361,7 +9367,7 @@
 </p:sld>
 </file>
 
-<file path=ppt/slides/slide6.xml><?xml version="1.0" encoding="utf-8"?>
+<file path=ppt/slides/slide5.xml><?xml version="1.0" encoding="utf-8"?>
 <p:sld xmlns:a="http://schemas.openxmlformats.org/drawingml/2006/main" xmlns:r="http://schemas.openxmlformats.org/officeDocument/2006/relationships" xmlns:p="http://schemas.openxmlformats.org/presentationml/2006/main">
   <p:cSld>
     <p:bg>
@@ -9841,7 +9847,7 @@
 </p:sld>
 </file>
 
-<file path=ppt/slides/slide7.xml><?xml version="1.0" encoding="utf-8"?>
+<file path=ppt/slides/slide6.xml><?xml version="1.0" encoding="utf-8"?>
 <p:sld xmlns:a="http://schemas.openxmlformats.org/drawingml/2006/main" xmlns:r="http://schemas.openxmlformats.org/officeDocument/2006/relationships" xmlns:p="http://schemas.openxmlformats.org/presentationml/2006/main">
   <p:cSld>
     <p:bg>
@@ -10318,7 +10324,7 @@
 </p:sld>
 </file>
 
-<file path=ppt/slides/slide8.xml><?xml version="1.0" encoding="utf-8"?>
+<file path=ppt/slides/slide7.xml><?xml version="1.0" encoding="utf-8"?>
 <p:sld xmlns:a="http://schemas.openxmlformats.org/drawingml/2006/main" xmlns:r="http://schemas.openxmlformats.org/officeDocument/2006/relationships" xmlns:p="http://schemas.openxmlformats.org/presentationml/2006/main">
   <p:cSld>
     <p:bg>
@@ -10813,7 +10819,7 @@
 </p:sld>
 </file>
 
-<file path=ppt/slides/slide9.xml><?xml version="1.0" encoding="utf-8"?>
+<file path=ppt/slides/slide8.xml><?xml version="1.0" encoding="utf-8"?>
 <p:sld xmlns:a="http://schemas.openxmlformats.org/drawingml/2006/main" xmlns:r="http://schemas.openxmlformats.org/officeDocument/2006/relationships" xmlns:p="http://schemas.openxmlformats.org/presentationml/2006/main">
   <p:cSld>
     <p:bg>
@@ -11611,6 +11617,703 @@
     <p:extLst>
       <p:ext uri="{BB962C8B-B14F-4D97-AF65-F5344CB8AC3E}">
         <p14:creationId xmlns:p14="http://schemas.microsoft.com/office/powerpoint/2010/main" val="1589834322"/>
+      </p:ext>
+    </p:extLst>
+  </p:cSld>
+  <p:clrMapOvr>
+    <a:masterClrMapping/>
+  </p:clrMapOvr>
+</p:sld>
+</file>
+
+<file path=ppt/slides/slide9.xml><?xml version="1.0" encoding="utf-8"?>
+<p:sld xmlns:a="http://schemas.openxmlformats.org/drawingml/2006/main" xmlns:r="http://schemas.openxmlformats.org/officeDocument/2006/relationships" xmlns:p="http://schemas.openxmlformats.org/presentationml/2006/main">
+  <p:cSld>
+    <p:bg>
+      <p:bgPr>
+        <a:solidFill>
+          <a:schemeClr val="bg2"/>
+        </a:solidFill>
+        <a:effectLst/>
+      </p:bgPr>
+    </p:bg>
+    <p:spTree>
+      <p:nvGrpSpPr>
+        <p:cNvPr id="1" name=""/>
+        <p:cNvGrpSpPr/>
+        <p:nvPr/>
+      </p:nvGrpSpPr>
+      <p:grpSpPr>
+        <a:xfrm>
+          <a:off x="0" y="0"/>
+          <a:ext cx="0" cy="0"/>
+          <a:chOff x="0" y="0"/>
+          <a:chExt cx="0" cy="0"/>
+        </a:xfrm>
+      </p:grpSpPr>
+      <p:sp useBgFill="1">
+        <p:nvSpPr>
+          <p:cNvPr id="8" name="Rectangle 7">
+            <a:extLst>
+              <a:ext uri="{FF2B5EF4-FFF2-40B4-BE49-F238E27FC236}">
+                <a16:creationId xmlns:a16="http://schemas.microsoft.com/office/drawing/2014/main" id="{C5176844-69C3-4F79-BE38-EA5BDDF4FEA4}"/>
+              </a:ext>
+              <a:ext uri="{C183D7F6-B498-43B3-948B-1728B52AA6E4}">
+                <adec:decorative xmlns:adec="http://schemas.microsoft.com/office/drawing/2017/decorative" val="1"/>
+              </a:ext>
+            </a:extLst>
+          </p:cNvPr>
+          <p:cNvSpPr>
+            <a:spLocks noGrp="1" noRot="1" noChangeAspect="1" noMove="1" noResize="1" noEditPoints="1" noAdjustHandles="1" noChangeArrowheads="1" noChangeShapeType="1" noTextEdit="1"/>
+          </p:cNvSpPr>
+          <p:nvPr>
+            <p:extLst>
+              <p:ext uri="{386F3935-93C4-4BCD-93E2-E3B085C9AB24}">
+                <p16:designElem xmlns:p16="http://schemas.microsoft.com/office/powerpoint/2015/main" val="1"/>
+              </p:ext>
+            </p:extLst>
+          </p:nvPr>
+        </p:nvSpPr>
+        <p:spPr>
+          <a:xfrm>
+            <a:off x="0" y="0"/>
+            <a:ext cx="12192000" cy="6858000"/>
+          </a:xfrm>
+          <a:prstGeom prst="rect">
+            <a:avLst/>
+          </a:prstGeom>
+          <a:ln>
+            <a:noFill/>
+          </a:ln>
+        </p:spPr>
+        <p:style>
+          <a:lnRef idx="2">
+            <a:schemeClr val="accent1">
+              <a:shade val="50000"/>
+            </a:schemeClr>
+          </a:lnRef>
+          <a:fillRef idx="1">
+            <a:schemeClr val="accent1"/>
+          </a:fillRef>
+          <a:effectRef idx="0">
+            <a:schemeClr val="accent1"/>
+          </a:effectRef>
+          <a:fontRef idx="minor">
+            <a:schemeClr val="lt1"/>
+          </a:fontRef>
+        </p:style>
+        <p:txBody>
+          <a:bodyPr rtlCol="0" anchor="ctr"/>
+          <a:lstStyle/>
+          <a:p>
+            <a:pPr algn="ctr"/>
+            <a:endParaRPr lang="en-US"/>
+          </a:p>
+        </p:txBody>
+      </p:sp>
+      <p:sp>
+        <p:nvSpPr>
+          <p:cNvPr id="2" name="Title 1">
+            <a:extLst>
+              <a:ext uri="{FF2B5EF4-FFF2-40B4-BE49-F238E27FC236}">
+                <a16:creationId xmlns:a16="http://schemas.microsoft.com/office/drawing/2014/main" id="{D94F8C82-BFBE-954C-A827-CD00AACF41C6}"/>
+              </a:ext>
+            </a:extLst>
+          </p:cNvPr>
+          <p:cNvSpPr>
+            <a:spLocks noGrp="1"/>
+          </p:cNvSpPr>
+          <p:nvPr>
+            <p:ph type="title"/>
+          </p:nvPr>
+        </p:nvSpPr>
+        <p:spPr>
+          <a:xfrm>
+            <a:off x="1068496" y="373240"/>
+            <a:ext cx="10355403" cy="1540106"/>
+          </a:xfrm>
+        </p:spPr>
+        <p:txBody>
+          <a:bodyPr>
+            <a:normAutofit/>
+          </a:bodyPr>
+          <a:lstStyle/>
+          <a:p>
+            <a:r>
+              <a:rPr lang="en-US" dirty="0"/>
+              <a:t>References</a:t>
+            </a:r>
+          </a:p>
+        </p:txBody>
+      </p:sp>
+      <p:cxnSp>
+        <p:nvCxnSpPr>
+          <p:cNvPr id="10" name="Straight Connector 9">
+            <a:extLst>
+              <a:ext uri="{FF2B5EF4-FFF2-40B4-BE49-F238E27FC236}">
+                <a16:creationId xmlns:a16="http://schemas.microsoft.com/office/drawing/2014/main" id="{33862825-C012-4895-A17E-F3D1F62D89DD}"/>
+              </a:ext>
+              <a:ext uri="{C183D7F6-B498-43B3-948B-1728B52AA6E4}">
+                <adec:decorative xmlns:adec="http://schemas.microsoft.com/office/drawing/2017/decorative" val="1"/>
+              </a:ext>
+            </a:extLst>
+          </p:cNvPr>
+          <p:cNvCxnSpPr>
+            <a:cxnSpLocks noGrp="1" noRot="1" noChangeAspect="1" noMove="1" noResize="1" noEditPoints="1" noAdjustHandles="1" noChangeArrowheads="1" noChangeShapeType="1"/>
+          </p:cNvCxnSpPr>
+          <p:nvPr>
+            <p:extLst>
+              <p:ext uri="{386F3935-93C4-4BCD-93E2-E3B085C9AB24}">
+                <p16:designElem xmlns:p16="http://schemas.microsoft.com/office/powerpoint/2015/main" val="1"/>
+              </p:ext>
+            </p:extLst>
+          </p:nvPr>
+        </p:nvCxnSpPr>
+        <p:spPr>
+          <a:xfrm>
+            <a:off x="758952" y="1143293"/>
+            <a:ext cx="0" cy="5714707"/>
+          </a:xfrm>
+          <a:prstGeom prst="line">
+            <a:avLst/>
+          </a:prstGeom>
+          <a:ln w="19050">
+            <a:solidFill>
+              <a:schemeClr val="tx1">
+                <a:lumMod val="85000"/>
+                <a:lumOff val="15000"/>
+              </a:schemeClr>
+            </a:solidFill>
+          </a:ln>
+        </p:spPr>
+        <p:style>
+          <a:lnRef idx="1">
+            <a:schemeClr val="accent1"/>
+          </a:lnRef>
+          <a:fillRef idx="0">
+            <a:schemeClr val="accent1"/>
+          </a:fillRef>
+          <a:effectRef idx="0">
+            <a:schemeClr val="accent1"/>
+          </a:effectRef>
+          <a:fontRef idx="minor">
+            <a:schemeClr val="tx1"/>
+          </a:fontRef>
+        </p:style>
+      </p:cxnSp>
+      <p:sp>
+        <p:nvSpPr>
+          <p:cNvPr id="3" name="Content Placeholder 2">
+            <a:extLst>
+              <a:ext uri="{FF2B5EF4-FFF2-40B4-BE49-F238E27FC236}">
+                <a16:creationId xmlns:a16="http://schemas.microsoft.com/office/drawing/2014/main" id="{FAC43DBF-2CF4-7E42-87F2-37EEF6A392B6}"/>
+              </a:ext>
+            </a:extLst>
+          </p:cNvPr>
+          <p:cNvSpPr>
+            <a:spLocks noGrp="1"/>
+          </p:cNvSpPr>
+          <p:nvPr>
+            <p:ph idx="1"/>
+          </p:nvPr>
+        </p:nvSpPr>
+        <p:spPr>
+          <a:xfrm>
+            <a:off x="1068495" y="1335505"/>
+            <a:ext cx="10664941" cy="5522495"/>
+          </a:xfrm>
+        </p:spPr>
+        <p:txBody>
+          <a:bodyPr>
+            <a:normAutofit/>
+          </a:bodyPr>
+          <a:lstStyle/>
+          <a:p>
+            <a:pPr marL="0" indent="0">
+              <a:buNone/>
+            </a:pPr>
+            <a:r>
+              <a:rPr lang="en-US" sz="1800" dirty="0"/>
+              <a:t>Jagdish </a:t>
+            </a:r>
+            <a:r>
+              <a:rPr lang="en-US" sz="1800" dirty="0" err="1"/>
+              <a:t>Bhagwan</a:t>
+            </a:r>
+            <a:r>
+              <a:rPr lang="en-US" sz="1800" dirty="0"/>
+              <a:t> </a:t>
+            </a:r>
+            <a:r>
+              <a:rPr lang="en-US" sz="1800" dirty="0" err="1"/>
+              <a:t>Chakole</a:t>
+            </a:r>
+            <a:r>
+              <a:rPr lang="en-US" sz="1800" dirty="0"/>
+              <a:t> et al. “A Q-learning </a:t>
+            </a:r>
+            <a:r>
+              <a:rPr lang="en-US" sz="1800" dirty="0" err="1"/>
+              <a:t>agentfor</a:t>
+            </a:r>
+            <a:r>
+              <a:rPr lang="en-US" sz="1800" dirty="0"/>
+              <a:t> automated trading in equity stock markets”. </a:t>
+            </a:r>
+            <a:r>
+              <a:rPr lang="en-US" sz="1800" dirty="0" err="1"/>
+              <a:t>In:Ex-pert</a:t>
+            </a:r>
+            <a:r>
+              <a:rPr lang="en-US" sz="1800" dirty="0"/>
+              <a:t> Systems with Applications163 (2021), p. 113761.</a:t>
+            </a:r>
+          </a:p>
+          <a:p>
+            <a:pPr marL="0" indent="0">
+              <a:buNone/>
+            </a:pPr>
+            <a:r>
+              <a:rPr lang="en-US" sz="1800" dirty="0"/>
+              <a:t>Marco </a:t>
+            </a:r>
+            <a:r>
+              <a:rPr lang="en-US" sz="1800" dirty="0" err="1"/>
+              <a:t>Corazza</a:t>
+            </a:r>
+            <a:r>
+              <a:rPr lang="en-US" sz="1800" dirty="0"/>
+              <a:t>. “Q-Learning-Based Financial Trad-</a:t>
+            </a:r>
+            <a:r>
+              <a:rPr lang="en-US" sz="1800" dirty="0" err="1"/>
+              <a:t>ing</a:t>
+            </a:r>
+            <a:r>
+              <a:rPr lang="en-US" sz="1800" dirty="0"/>
+              <a:t>: Some Results and Comparisons”. </a:t>
+            </a:r>
+            <a:r>
+              <a:rPr lang="en-US" sz="1800" dirty="0" err="1"/>
+              <a:t>In:Progressesin</a:t>
+            </a:r>
+            <a:r>
+              <a:rPr lang="en-US" sz="1800" dirty="0"/>
+              <a:t> Artificial Intelligence and Neural Systems. Springer,2021, pp. 343–355.</a:t>
+            </a:r>
+          </a:p>
+          <a:p>
+            <a:pPr marL="0" indent="0">
+              <a:buNone/>
+            </a:pPr>
+            <a:r>
+              <a:rPr lang="en-US" sz="1800" dirty="0" err="1"/>
+              <a:t>Boming</a:t>
+            </a:r>
+            <a:r>
+              <a:rPr lang="en-US" sz="1800" dirty="0"/>
+              <a:t> Huang et al. “Automated trading systems </a:t>
+            </a:r>
+            <a:r>
+              <a:rPr lang="en-US" sz="1800" dirty="0" err="1"/>
+              <a:t>sta-tistical</a:t>
+            </a:r>
+            <a:r>
+              <a:rPr lang="en-US" sz="1800" dirty="0"/>
+              <a:t> and machine learning methods and </a:t>
+            </a:r>
+            <a:r>
+              <a:rPr lang="en-US" sz="1800" dirty="0" err="1"/>
+              <a:t>hardwareimplementation</a:t>
+            </a:r>
+            <a:r>
+              <a:rPr lang="en-US" sz="1800" dirty="0"/>
+              <a:t>: a survey”. </a:t>
+            </a:r>
+            <a:r>
+              <a:rPr lang="en-US" sz="1800" dirty="0" err="1"/>
+              <a:t>In:Enterprise</a:t>
+            </a:r>
+            <a:r>
+              <a:rPr lang="en-US" sz="1800" dirty="0"/>
+              <a:t> InformationSystems13.1 (2019), pp. 132–144.</a:t>
+            </a:r>
+          </a:p>
+          <a:p>
+            <a:pPr marL="0" indent="0">
+              <a:buNone/>
+            </a:pPr>
+            <a:r>
+              <a:rPr lang="en-US" sz="1800" dirty="0"/>
+              <a:t>Jae Won Lee. “Stock price prediction using reinforce-</a:t>
+            </a:r>
+            <a:r>
+              <a:rPr lang="en-US" sz="1800" dirty="0" err="1"/>
+              <a:t>ment</a:t>
+            </a:r>
+            <a:r>
+              <a:rPr lang="en-US" sz="1800" dirty="0"/>
+              <a:t> learning”. In: 1 (2001), pp. 690–695.</a:t>
+            </a:r>
+          </a:p>
+          <a:p>
+            <a:pPr marL="0" indent="0">
+              <a:buNone/>
+            </a:pPr>
+            <a:r>
+              <a:rPr lang="en-US" sz="1800" dirty="0"/>
+              <a:t>Volodymyr </a:t>
+            </a:r>
+            <a:r>
+              <a:rPr lang="en-US" sz="1800" dirty="0" err="1"/>
+              <a:t>Mnih</a:t>
+            </a:r>
+            <a:r>
+              <a:rPr lang="en-US" sz="1800" dirty="0"/>
+              <a:t> et al. “Human-level control </a:t>
+            </a:r>
+            <a:r>
+              <a:rPr lang="en-US" sz="1800" dirty="0" err="1"/>
+              <a:t>throughdeep</a:t>
+            </a:r>
+            <a:r>
+              <a:rPr lang="en-US" sz="1800" dirty="0"/>
+              <a:t> reinforcement learning”. In:nature518.7540(2015), pp. 529–533.</a:t>
+            </a:r>
+          </a:p>
+          <a:p>
+            <a:pPr marL="0" indent="0">
+              <a:buNone/>
+            </a:pPr>
+            <a:r>
+              <a:rPr lang="en-US" sz="1800" dirty="0" err="1"/>
+              <a:t>Rommy</a:t>
+            </a:r>
+            <a:r>
+              <a:rPr lang="en-US" sz="1800" dirty="0"/>
+              <a:t> </a:t>
+            </a:r>
+            <a:r>
+              <a:rPr lang="en-US" sz="1800" dirty="0" err="1"/>
+              <a:t>Pramudya</a:t>
+            </a:r>
+            <a:r>
+              <a:rPr lang="en-US" sz="1800" dirty="0"/>
+              <a:t> and Sakina </a:t>
+            </a:r>
+            <a:r>
+              <a:rPr lang="en-US" sz="1800" dirty="0" err="1"/>
+              <a:t>Ichsani</a:t>
+            </a:r>
+            <a:r>
+              <a:rPr lang="en-US" sz="1800" dirty="0"/>
+              <a:t>. “Efficiency </a:t>
+            </a:r>
+            <a:r>
+              <a:rPr lang="en-US" sz="1800" dirty="0" err="1"/>
+              <a:t>oftechnical</a:t>
+            </a:r>
+            <a:r>
+              <a:rPr lang="en-US" sz="1800" dirty="0"/>
+              <a:t> analysis for the stock trading”. </a:t>
+            </a:r>
+            <a:r>
+              <a:rPr lang="en-US" sz="1800" dirty="0" err="1"/>
+              <a:t>In:Inter-national</a:t>
+            </a:r>
+            <a:r>
+              <a:rPr lang="en-US" sz="1800" dirty="0"/>
+              <a:t> Journal of Finance &amp; Banking Studies9.1(2020), pp. 58–67.</a:t>
+            </a:r>
+          </a:p>
+          <a:p>
+            <a:pPr marL="0" indent="0">
+              <a:buNone/>
+            </a:pPr>
+            <a:r>
+              <a:rPr lang="en-US" sz="1800" dirty="0"/>
+              <a:t>Melrose Roderick, James </a:t>
+            </a:r>
+            <a:r>
+              <a:rPr lang="en-US" sz="1800" dirty="0" err="1"/>
+              <a:t>MacGlashan</a:t>
+            </a:r>
+            <a:r>
+              <a:rPr lang="en-US" sz="1800" dirty="0"/>
+              <a:t>, and </a:t>
+            </a:r>
+            <a:r>
+              <a:rPr lang="en-US" sz="1800" dirty="0" err="1"/>
+              <a:t>StefanieTellex</a:t>
+            </a:r>
+            <a:r>
+              <a:rPr lang="en-US" sz="1800" dirty="0"/>
+              <a:t>. “Implementing the deep q-network”. </a:t>
+            </a:r>
+            <a:r>
+              <a:rPr lang="en-US" sz="1800" dirty="0" err="1"/>
+              <a:t>In:arXivpreprint</a:t>
+            </a:r>
+            <a:r>
+              <a:rPr lang="en-US" sz="1800" dirty="0"/>
+              <a:t> arXiv:1711.07478(2017).</a:t>
+            </a:r>
+          </a:p>
+          <a:p>
+            <a:pPr marL="0" indent="0">
+              <a:buNone/>
+            </a:pPr>
+            <a:r>
+              <a:rPr lang="en-US" sz="1800" dirty="0"/>
+              <a:t>Yong Shi et al. “Stock trading rule discovery with </a:t>
+            </a:r>
+            <a:r>
+              <a:rPr lang="en-US" sz="1800" dirty="0" err="1"/>
+              <a:t>dou-ble</a:t>
+            </a:r>
+            <a:r>
+              <a:rPr lang="en-US" sz="1800" dirty="0"/>
+              <a:t> deep Q-network”. </a:t>
+            </a:r>
+            <a:r>
+              <a:rPr lang="en-US" sz="1800" dirty="0" err="1"/>
+              <a:t>In:Applied</a:t>
+            </a:r>
+            <a:r>
+              <a:rPr lang="en-US" sz="1800" dirty="0"/>
+              <a:t> Soft Computing107(2021), p. 107320.</a:t>
+            </a:r>
+          </a:p>
+        </p:txBody>
+      </p:sp>
+      <p:sp>
+        <p:nvSpPr>
+          <p:cNvPr id="12" name="Freeform 6">
+            <a:extLst>
+              <a:ext uri="{FF2B5EF4-FFF2-40B4-BE49-F238E27FC236}">
+                <a16:creationId xmlns:a16="http://schemas.microsoft.com/office/drawing/2014/main" id="{A101E513-AF74-4E9D-A31F-99664250722D}"/>
+              </a:ext>
+              <a:ext uri="{C183D7F6-B498-43B3-948B-1728B52AA6E4}">
+                <adec:decorative xmlns:adec="http://schemas.microsoft.com/office/drawing/2017/decorative" val="1"/>
+              </a:ext>
+            </a:extLst>
+          </p:cNvPr>
+          <p:cNvSpPr>
+            <a:spLocks noGrp="1" noRot="1" noChangeAspect="1" noMove="1" noResize="1" noEditPoints="1" noAdjustHandles="1" noChangeArrowheads="1" noChangeShapeType="1" noTextEdit="1"/>
+          </p:cNvSpPr>
+          <p:nvPr>
+            <p:extLst>
+              <p:ext uri="{386F3935-93C4-4BCD-93E2-E3B085C9AB24}">
+                <p16:designElem xmlns:p16="http://schemas.microsoft.com/office/powerpoint/2015/main" val="1"/>
+              </p:ext>
+            </p:extLst>
+          </p:nvPr>
+        </p:nvSpPr>
+        <p:spPr bwMode="auto">
+          <a:xfrm>
+            <a:off x="11784011" y="5783564"/>
+            <a:ext cx="407988" cy="819150"/>
+          </a:xfrm>
+          <a:custGeom>
+            <a:avLst/>
+            <a:gdLst/>
+            <a:ahLst/>
+            <a:cxnLst/>
+            <a:rect l="0" t="0" r="r" b="b"/>
+            <a:pathLst>
+              <a:path w="1799" h="3612">
+                <a:moveTo>
+                  <a:pt x="1799" y="0"/>
+                </a:moveTo>
+                <a:lnTo>
+                  <a:pt x="1799" y="3612"/>
+                </a:lnTo>
+                <a:lnTo>
+                  <a:pt x="1686" y="3609"/>
+                </a:lnTo>
+                <a:lnTo>
+                  <a:pt x="1574" y="3598"/>
+                </a:lnTo>
+                <a:lnTo>
+                  <a:pt x="1464" y="3581"/>
+                </a:lnTo>
+                <a:lnTo>
+                  <a:pt x="1357" y="3557"/>
+                </a:lnTo>
+                <a:lnTo>
+                  <a:pt x="1251" y="3527"/>
+                </a:lnTo>
+                <a:lnTo>
+                  <a:pt x="1150" y="3490"/>
+                </a:lnTo>
+                <a:lnTo>
+                  <a:pt x="1050" y="3448"/>
+                </a:lnTo>
+                <a:lnTo>
+                  <a:pt x="953" y="3401"/>
+                </a:lnTo>
+                <a:lnTo>
+                  <a:pt x="860" y="3347"/>
+                </a:lnTo>
+                <a:lnTo>
+                  <a:pt x="771" y="3289"/>
+                </a:lnTo>
+                <a:lnTo>
+                  <a:pt x="686" y="3224"/>
+                </a:lnTo>
+                <a:lnTo>
+                  <a:pt x="604" y="3156"/>
+                </a:lnTo>
+                <a:lnTo>
+                  <a:pt x="527" y="3083"/>
+                </a:lnTo>
+                <a:lnTo>
+                  <a:pt x="454" y="3005"/>
+                </a:lnTo>
+                <a:lnTo>
+                  <a:pt x="386" y="2923"/>
+                </a:lnTo>
+                <a:lnTo>
+                  <a:pt x="323" y="2838"/>
+                </a:lnTo>
+                <a:lnTo>
+                  <a:pt x="265" y="2748"/>
+                </a:lnTo>
+                <a:lnTo>
+                  <a:pt x="211" y="2655"/>
+                </a:lnTo>
+                <a:lnTo>
+                  <a:pt x="163" y="2559"/>
+                </a:lnTo>
+                <a:lnTo>
+                  <a:pt x="121" y="2459"/>
+                </a:lnTo>
+                <a:lnTo>
+                  <a:pt x="85" y="2356"/>
+                </a:lnTo>
+                <a:lnTo>
+                  <a:pt x="55" y="2251"/>
+                </a:lnTo>
+                <a:lnTo>
+                  <a:pt x="32" y="2143"/>
+                </a:lnTo>
+                <a:lnTo>
+                  <a:pt x="14" y="2033"/>
+                </a:lnTo>
+                <a:lnTo>
+                  <a:pt x="4" y="1920"/>
+                </a:lnTo>
+                <a:lnTo>
+                  <a:pt x="0" y="1806"/>
+                </a:lnTo>
+                <a:lnTo>
+                  <a:pt x="4" y="1692"/>
+                </a:lnTo>
+                <a:lnTo>
+                  <a:pt x="14" y="1580"/>
+                </a:lnTo>
+                <a:lnTo>
+                  <a:pt x="32" y="1469"/>
+                </a:lnTo>
+                <a:lnTo>
+                  <a:pt x="55" y="1362"/>
+                </a:lnTo>
+                <a:lnTo>
+                  <a:pt x="85" y="1256"/>
+                </a:lnTo>
+                <a:lnTo>
+                  <a:pt x="121" y="1154"/>
+                </a:lnTo>
+                <a:lnTo>
+                  <a:pt x="163" y="1054"/>
+                </a:lnTo>
+                <a:lnTo>
+                  <a:pt x="211" y="958"/>
+                </a:lnTo>
+                <a:lnTo>
+                  <a:pt x="265" y="864"/>
+                </a:lnTo>
+                <a:lnTo>
+                  <a:pt x="323" y="774"/>
+                </a:lnTo>
+                <a:lnTo>
+                  <a:pt x="386" y="689"/>
+                </a:lnTo>
+                <a:lnTo>
+                  <a:pt x="454" y="607"/>
+                </a:lnTo>
+                <a:lnTo>
+                  <a:pt x="527" y="529"/>
+                </a:lnTo>
+                <a:lnTo>
+                  <a:pt x="604" y="456"/>
+                </a:lnTo>
+                <a:lnTo>
+                  <a:pt x="686" y="388"/>
+                </a:lnTo>
+                <a:lnTo>
+                  <a:pt x="771" y="325"/>
+                </a:lnTo>
+                <a:lnTo>
+                  <a:pt x="860" y="266"/>
+                </a:lnTo>
+                <a:lnTo>
+                  <a:pt x="953" y="212"/>
+                </a:lnTo>
+                <a:lnTo>
+                  <a:pt x="1050" y="164"/>
+                </a:lnTo>
+                <a:lnTo>
+                  <a:pt x="1150" y="122"/>
+                </a:lnTo>
+                <a:lnTo>
+                  <a:pt x="1251" y="85"/>
+                </a:lnTo>
+                <a:lnTo>
+                  <a:pt x="1357" y="55"/>
+                </a:lnTo>
+                <a:lnTo>
+                  <a:pt x="1464" y="32"/>
+                </a:lnTo>
+                <a:lnTo>
+                  <a:pt x="1574" y="14"/>
+                </a:lnTo>
+                <a:lnTo>
+                  <a:pt x="1686" y="5"/>
+                </a:lnTo>
+                <a:lnTo>
+                  <a:pt x="1799" y="0"/>
+                </a:lnTo>
+                <a:close/>
+              </a:path>
+            </a:pathLst>
+          </a:custGeom>
+          <a:solidFill>
+            <a:schemeClr val="tx1">
+              <a:lumMod val="85000"/>
+              <a:lumOff val="15000"/>
+            </a:schemeClr>
+          </a:solidFill>
+          <a:ln w="0">
+            <a:noFill/>
+            <a:prstDash val="solid"/>
+            <a:round/>
+            <a:headEnd/>
+            <a:tailEnd/>
+          </a:ln>
+        </p:spPr>
+        <p:txBody>
+          <a:bodyPr anchor="ctr"/>
+          <a:lstStyle/>
+          <a:p>
+            <a:endParaRPr lang="en-US"/>
+          </a:p>
+        </p:txBody>
+      </p:sp>
+    </p:spTree>
+    <p:extLst>
+      <p:ext uri="{BB962C8B-B14F-4D97-AF65-F5344CB8AC3E}">
+        <p14:creationId xmlns:p14="http://schemas.microsoft.com/office/powerpoint/2010/main" val="3901088645"/>
       </p:ext>
     </p:extLst>
   </p:cSld>
@@ -11819,4 +12522,299 @@
     </a:ext>
   </a:extLst>
 </a:theme>
+</file>
+
+<file path=ppt/theme/theme2.xml><?xml version="1.0" encoding="utf-8"?>
+<a:theme xmlns:a="http://schemas.openxmlformats.org/drawingml/2006/main" name="Office Theme">
+  <a:themeElements>
+    <a:clrScheme name="Office">
+      <a:dk1>
+        <a:sysClr val="windowText" lastClr="000000"/>
+      </a:dk1>
+      <a:lt1>
+        <a:sysClr val="window" lastClr="FFFFFF"/>
+      </a:lt1>
+      <a:dk2>
+        <a:srgbClr val="44546A"/>
+      </a:dk2>
+      <a:lt2>
+        <a:srgbClr val="E7E6E6"/>
+      </a:lt2>
+      <a:accent1>
+        <a:srgbClr val="4472C4"/>
+      </a:accent1>
+      <a:accent2>
+        <a:srgbClr val="ED7D31"/>
+      </a:accent2>
+      <a:accent3>
+        <a:srgbClr val="A5A5A5"/>
+      </a:accent3>
+      <a:accent4>
+        <a:srgbClr val="FFC000"/>
+      </a:accent4>
+      <a:accent5>
+        <a:srgbClr val="5B9BD5"/>
+      </a:accent5>
+      <a:accent6>
+        <a:srgbClr val="70AD47"/>
+      </a:accent6>
+      <a:hlink>
+        <a:srgbClr val="0563C1"/>
+      </a:hlink>
+      <a:folHlink>
+        <a:srgbClr val="954F72"/>
+      </a:folHlink>
+    </a:clrScheme>
+    <a:fontScheme name="Office">
+      <a:majorFont>
+        <a:latin typeface="Calibri Light" panose="020F0302020204030204"/>
+        <a:ea typeface=""/>
+        <a:cs typeface=""/>
+        <a:font script="Jpan" typeface="游ゴシック Light"/>
+        <a:font script="Hang" typeface="맑은 고딕"/>
+        <a:font script="Hans" typeface="等线 Light"/>
+        <a:font script="Hant" typeface="新細明體"/>
+        <a:font script="Arab" typeface="Times New Roman"/>
+        <a:font script="Hebr" typeface="Times New Roman"/>
+        <a:font script="Thai" typeface="Angsana New"/>
+        <a:font script="Ethi" typeface="Nyala"/>
+        <a:font script="Beng" typeface="Vrinda"/>
+        <a:font script="Gujr" typeface="Shruti"/>
+        <a:font script="Khmr" typeface="MoolBoran"/>
+        <a:font script="Knda" typeface="Tunga"/>
+        <a:font script="Guru" typeface="Raavi"/>
+        <a:font script="Cans" typeface="Euphemia"/>
+        <a:font script="Cher" typeface="Plantagenet Cherokee"/>
+        <a:font script="Yiii" typeface="Microsoft Yi Baiti"/>
+        <a:font script="Tibt" typeface="Microsoft Himalaya"/>
+        <a:font script="Thaa" typeface="MV Boli"/>
+        <a:font script="Deva" typeface="Mangal"/>
+        <a:font script="Telu" typeface="Gautami"/>
+        <a:font script="Taml" typeface="Latha"/>
+        <a:font script="Syrc" typeface="Estrangelo Edessa"/>
+        <a:font script="Orya" typeface="Kalinga"/>
+        <a:font script="Mlym" typeface="Kartika"/>
+        <a:font script="Laoo" typeface="DokChampa"/>
+        <a:font script="Sinh" typeface="Iskoola Pota"/>
+        <a:font script="Mong" typeface="Mongolian Baiti"/>
+        <a:font script="Viet" typeface="Times New Roman"/>
+        <a:font script="Uigh" typeface="Microsoft Uighur"/>
+        <a:font script="Geor" typeface="Sylfaen"/>
+        <a:font script="Armn" typeface="Arial"/>
+        <a:font script="Bugi" typeface="Leelawadee UI"/>
+        <a:font script="Bopo" typeface="Microsoft JhengHei"/>
+        <a:font script="Java" typeface="Javanese Text"/>
+        <a:font script="Lisu" typeface="Segoe UI"/>
+        <a:font script="Mymr" typeface="Myanmar Text"/>
+        <a:font script="Nkoo" typeface="Ebrima"/>
+        <a:font script="Olck" typeface="Nirmala UI"/>
+        <a:font script="Osma" typeface="Ebrima"/>
+        <a:font script="Phag" typeface="Phagspa"/>
+        <a:font script="Syrn" typeface="Estrangelo Edessa"/>
+        <a:font script="Syrj" typeface="Estrangelo Edessa"/>
+        <a:font script="Syre" typeface="Estrangelo Edessa"/>
+        <a:font script="Sora" typeface="Nirmala UI"/>
+        <a:font script="Tale" typeface="Microsoft Tai Le"/>
+        <a:font script="Talu" typeface="Microsoft New Tai Lue"/>
+        <a:font script="Tfng" typeface="Ebrima"/>
+      </a:majorFont>
+      <a:minorFont>
+        <a:latin typeface="Calibri" panose="020F0502020204030204"/>
+        <a:ea typeface=""/>
+        <a:cs typeface=""/>
+        <a:font script="Jpan" typeface="游ゴシック"/>
+        <a:font script="Hang" typeface="맑은 고딕"/>
+        <a:font script="Hans" typeface="等线"/>
+        <a:font script="Hant" typeface="新細明體"/>
+        <a:font script="Arab" typeface="Arial"/>
+        <a:font script="Hebr" typeface="Arial"/>
+        <a:font script="Thai" typeface="Cordia New"/>
+        <a:font script="Ethi" typeface="Nyala"/>
+        <a:font script="Beng" typeface="Vrinda"/>
+        <a:font script="Gujr" typeface="Shruti"/>
+        <a:font script="Khmr" typeface="DaunPenh"/>
+        <a:font script="Knda" typeface="Tunga"/>
+        <a:font script="Guru" typeface="Raavi"/>
+        <a:font script="Cans" typeface="Euphemia"/>
+        <a:font script="Cher" typeface="Plantagenet Cherokee"/>
+        <a:font script="Yiii" typeface="Microsoft Yi Baiti"/>
+        <a:font script="Tibt" typeface="Microsoft Himalaya"/>
+        <a:font script="Thaa" typeface="MV Boli"/>
+        <a:font script="Deva" typeface="Mangal"/>
+        <a:font script="Telu" typeface="Gautami"/>
+        <a:font script="Taml" typeface="Latha"/>
+        <a:font script="Syrc" typeface="Estrangelo Edessa"/>
+        <a:font script="Orya" typeface="Kalinga"/>
+        <a:font script="Mlym" typeface="Kartika"/>
+        <a:font script="Laoo" typeface="DokChampa"/>
+        <a:font script="Sinh" typeface="Iskoola Pota"/>
+        <a:font script="Mong" typeface="Mongolian Baiti"/>
+        <a:font script="Viet" typeface="Arial"/>
+        <a:font script="Uigh" typeface="Microsoft Uighur"/>
+        <a:font script="Geor" typeface="Sylfaen"/>
+        <a:font script="Armn" typeface="Arial"/>
+        <a:font script="Bugi" typeface="Leelawadee UI"/>
+        <a:font script="Bopo" typeface="Microsoft JhengHei"/>
+        <a:font script="Java" typeface="Javanese Text"/>
+        <a:font script="Lisu" typeface="Segoe UI"/>
+        <a:font script="Mymr" typeface="Myanmar Text"/>
+        <a:font script="Nkoo" typeface="Ebrima"/>
+        <a:font script="Olck" typeface="Nirmala UI"/>
+        <a:font script="Osma" typeface="Ebrima"/>
+        <a:font script="Phag" typeface="Phagspa"/>
+        <a:font script="Syrn" typeface="Estrangelo Edessa"/>
+        <a:font script="Syrj" typeface="Estrangelo Edessa"/>
+        <a:font script="Syre" typeface="Estrangelo Edessa"/>
+        <a:font script="Sora" typeface="Nirmala UI"/>
+        <a:font script="Tale" typeface="Microsoft Tai Le"/>
+        <a:font script="Talu" typeface="Microsoft New Tai Lue"/>
+        <a:font script="Tfng" typeface="Ebrima"/>
+      </a:minorFont>
+    </a:fontScheme>
+    <a:fmtScheme name="Office">
+      <a:fillStyleLst>
+        <a:solidFill>
+          <a:schemeClr val="phClr"/>
+        </a:solidFill>
+        <a:gradFill rotWithShape="1">
+          <a:gsLst>
+            <a:gs pos="0">
+              <a:schemeClr val="phClr">
+                <a:lumMod val="110000"/>
+                <a:satMod val="105000"/>
+                <a:tint val="67000"/>
+              </a:schemeClr>
+            </a:gs>
+            <a:gs pos="50000">
+              <a:schemeClr val="phClr">
+                <a:lumMod val="105000"/>
+                <a:satMod val="103000"/>
+                <a:tint val="73000"/>
+              </a:schemeClr>
+            </a:gs>
+            <a:gs pos="100000">
+              <a:schemeClr val="phClr">
+                <a:lumMod val="105000"/>
+                <a:satMod val="109000"/>
+                <a:tint val="81000"/>
+              </a:schemeClr>
+            </a:gs>
+          </a:gsLst>
+          <a:lin ang="5400000" scaled="0"/>
+        </a:gradFill>
+        <a:gradFill rotWithShape="1">
+          <a:gsLst>
+            <a:gs pos="0">
+              <a:schemeClr val="phClr">
+                <a:satMod val="103000"/>
+                <a:lumMod val="102000"/>
+                <a:tint val="94000"/>
+              </a:schemeClr>
+            </a:gs>
+            <a:gs pos="50000">
+              <a:schemeClr val="phClr">
+                <a:satMod val="110000"/>
+                <a:lumMod val="100000"/>
+                <a:shade val="100000"/>
+              </a:schemeClr>
+            </a:gs>
+            <a:gs pos="100000">
+              <a:schemeClr val="phClr">
+                <a:lumMod val="99000"/>
+                <a:satMod val="120000"/>
+                <a:shade val="78000"/>
+              </a:schemeClr>
+            </a:gs>
+          </a:gsLst>
+          <a:lin ang="5400000" scaled="0"/>
+        </a:gradFill>
+      </a:fillStyleLst>
+      <a:lnStyleLst>
+        <a:ln w="6350" cap="flat" cmpd="sng" algn="ctr">
+          <a:solidFill>
+            <a:schemeClr val="phClr"/>
+          </a:solidFill>
+          <a:prstDash val="solid"/>
+          <a:miter lim="800000"/>
+        </a:ln>
+        <a:ln w="12700" cap="flat" cmpd="sng" algn="ctr">
+          <a:solidFill>
+            <a:schemeClr val="phClr"/>
+          </a:solidFill>
+          <a:prstDash val="solid"/>
+          <a:miter lim="800000"/>
+        </a:ln>
+        <a:ln w="19050" cap="flat" cmpd="sng" algn="ctr">
+          <a:solidFill>
+            <a:schemeClr val="phClr"/>
+          </a:solidFill>
+          <a:prstDash val="solid"/>
+          <a:miter lim="800000"/>
+        </a:ln>
+      </a:lnStyleLst>
+      <a:effectStyleLst>
+        <a:effectStyle>
+          <a:effectLst/>
+        </a:effectStyle>
+        <a:effectStyle>
+          <a:effectLst/>
+        </a:effectStyle>
+        <a:effectStyle>
+          <a:effectLst>
+            <a:outerShdw blurRad="57150" dist="19050" dir="5400000" algn="ctr" rotWithShape="0">
+              <a:srgbClr val="000000">
+                <a:alpha val="63000"/>
+              </a:srgbClr>
+            </a:outerShdw>
+          </a:effectLst>
+        </a:effectStyle>
+      </a:effectStyleLst>
+      <a:bgFillStyleLst>
+        <a:solidFill>
+          <a:schemeClr val="phClr"/>
+        </a:solidFill>
+        <a:solidFill>
+          <a:schemeClr val="phClr">
+            <a:tint val="95000"/>
+            <a:satMod val="170000"/>
+          </a:schemeClr>
+        </a:solidFill>
+        <a:gradFill rotWithShape="1">
+          <a:gsLst>
+            <a:gs pos="0">
+              <a:schemeClr val="phClr">
+                <a:tint val="93000"/>
+                <a:satMod val="150000"/>
+                <a:shade val="98000"/>
+                <a:lumMod val="102000"/>
+              </a:schemeClr>
+            </a:gs>
+            <a:gs pos="50000">
+              <a:schemeClr val="phClr">
+                <a:tint val="98000"/>
+                <a:satMod val="130000"/>
+                <a:shade val="90000"/>
+                <a:lumMod val="103000"/>
+              </a:schemeClr>
+            </a:gs>
+            <a:gs pos="100000">
+              <a:schemeClr val="phClr">
+                <a:shade val="63000"/>
+                <a:satMod val="120000"/>
+              </a:schemeClr>
+            </a:gs>
+          </a:gsLst>
+          <a:lin ang="5400000" scaled="0"/>
+        </a:gradFill>
+      </a:bgFillStyleLst>
+    </a:fmtScheme>
+  </a:themeElements>
+  <a:objectDefaults/>
+  <a:extraClrSchemeLst/>
+  <a:extLst>
+    <a:ext uri="{05A4C25C-085E-4340-85A3-A5531E510DB2}">
+      <thm15:themeFamily xmlns:thm15="http://schemas.microsoft.com/office/thememl/2012/main" name="Office Theme" id="{62F939B6-93AF-4DB8-9C6B-D6C7DFDC589F}" vid="{4A3C46E8-61CC-4603-A589-7422A47A8E4A}"/>
+    </a:ext>
+  </a:extLst>
+</a:theme>
 </file>
</xml_diff>

<commit_message>
Update Power Point with references
</commit_message>
<xml_diff>
--- a/RL Crypto Midterm.pptx
+++ b/RL Crypto Midterm.pptx
@@ -3067,7 +3067,7 @@
           <a:p>
             <a:fld id="{E3DE979D-38C2-1542-B957-FAD972FD5FD6}" type="datetimeFigureOut">
               <a:rPr lang="en-US" smtClean="0"/>
-              <a:t>10/27/21</a:t>
+              <a:t>10/27/2021</a:t>
             </a:fld>
             <a:endParaRPr lang="en-US"/>
           </a:p>
@@ -3839,7 +3839,7 @@
           <a:p>
             <a:fld id="{53BEF823-48A5-43FC-BE03-E79964288B41}" type="datetimeFigureOut">
               <a:rPr lang="en-US" smtClean="0"/>
-              <a:t>10/27/21</a:t>
+              <a:t>10/27/2021</a:t>
             </a:fld>
             <a:endParaRPr lang="en-US" dirty="0"/>
           </a:p>
@@ -4050,7 +4050,7 @@
             <a:fld id="{53BEF823-48A5-43FC-BE03-E79964288B41}" type="datetimeFigureOut">
               <a:rPr lang="en-US" smtClean="0"/>
               <a:pPr algn="r"/>
-              <a:t>10/27/21</a:t>
+              <a:t>10/27/2021</a:t>
             </a:fld>
             <a:endParaRPr lang="en-US" dirty="0"/>
           </a:p>
@@ -4265,7 +4265,7 @@
             <a:fld id="{53BEF823-48A5-43FC-BE03-E79964288B41}" type="datetimeFigureOut">
               <a:rPr lang="en-US" smtClean="0"/>
               <a:pPr algn="r"/>
-              <a:t>10/27/21</a:t>
+              <a:t>10/27/2021</a:t>
             </a:fld>
             <a:endParaRPr lang="en-US" dirty="0"/>
           </a:p>
@@ -4468,7 +4468,7 @@
             <a:fld id="{53BEF823-48A5-43FC-BE03-E79964288B41}" type="datetimeFigureOut">
               <a:rPr lang="en-US" smtClean="0"/>
               <a:pPr algn="r"/>
-              <a:t>10/27/21</a:t>
+              <a:t>10/27/2021</a:t>
             </a:fld>
             <a:endParaRPr lang="en-US" dirty="0"/>
           </a:p>
@@ -4752,7 +4752,7 @@
             <a:fld id="{53BEF823-48A5-43FC-BE03-E79964288B41}" type="datetimeFigureOut">
               <a:rPr lang="en-US" smtClean="0"/>
               <a:pPr algn="r"/>
-              <a:t>10/27/21</a:t>
+              <a:t>10/27/2021</a:t>
             </a:fld>
             <a:endParaRPr lang="en-US" dirty="0"/>
           </a:p>
@@ -4996,7 +4996,7 @@
             <a:fld id="{53BEF823-48A5-43FC-BE03-E79964288B41}" type="datetimeFigureOut">
               <a:rPr lang="en-US" smtClean="0"/>
               <a:pPr algn="r"/>
-              <a:t>10/27/21</a:t>
+              <a:t>10/27/2021</a:t>
             </a:fld>
             <a:endParaRPr lang="en-US" dirty="0"/>
           </a:p>
@@ -5439,7 +5439,7 @@
             <a:fld id="{53BEF823-48A5-43FC-BE03-E79964288B41}" type="datetimeFigureOut">
               <a:rPr lang="en-US" smtClean="0"/>
               <a:pPr algn="r"/>
-              <a:t>10/27/21</a:t>
+              <a:t>10/27/2021</a:t>
             </a:fld>
             <a:endParaRPr lang="en-US" dirty="0"/>
           </a:p>
@@ -5585,7 +5585,7 @@
             <a:fld id="{53BEF823-48A5-43FC-BE03-E79964288B41}" type="datetimeFigureOut">
               <a:rPr lang="en-US" smtClean="0"/>
               <a:pPr algn="r"/>
-              <a:t>10/27/21</a:t>
+              <a:t>10/27/2021</a:t>
             </a:fld>
             <a:endParaRPr lang="en-US" dirty="0"/>
           </a:p>
@@ -5703,7 +5703,7 @@
             <a:fld id="{53BEF823-48A5-43FC-BE03-E79964288B41}" type="datetimeFigureOut">
               <a:rPr lang="en-US" smtClean="0"/>
               <a:pPr algn="r"/>
-              <a:t>10/27/21</a:t>
+              <a:t>10/27/2021</a:t>
             </a:fld>
             <a:endParaRPr lang="en-US" dirty="0"/>
           </a:p>
@@ -5987,7 +5987,7 @@
             <a:fld id="{53BEF823-48A5-43FC-BE03-E79964288B41}" type="datetimeFigureOut">
               <a:rPr lang="en-US" smtClean="0"/>
               <a:pPr algn="r"/>
-              <a:t>10/27/21</a:t>
+              <a:t>10/27/2021</a:t>
             </a:fld>
             <a:endParaRPr lang="en-US" dirty="0"/>
           </a:p>
@@ -6282,7 +6282,7 @@
             <a:fld id="{53BEF823-48A5-43FC-BE03-E79964288B41}" type="datetimeFigureOut">
               <a:rPr lang="en-US" smtClean="0"/>
               <a:pPr algn="r"/>
-              <a:t>10/27/21</a:t>
+              <a:t>10/27/2021</a:t>
             </a:fld>
             <a:endParaRPr lang="en-US" dirty="0"/>
           </a:p>
@@ -6777,7 +6777,7 @@
             <a:fld id="{53BEF823-48A5-43FC-BE03-E79964288B41}" type="datetimeFigureOut">
               <a:rPr lang="en-US" smtClean="0"/>
               <a:pPr algn="r"/>
-              <a:t>10/27/21</a:t>
+              <a:t>10/27/2021</a:t>
             </a:fld>
             <a:endParaRPr lang="en-US" dirty="0"/>
           </a:p>
@@ -11825,7 +11825,7 @@
         </p:spPr>
         <p:txBody>
           <a:bodyPr>
-            <a:normAutofit/>
+            <a:noAutofit/>
           </a:bodyPr>
           <a:lstStyle/>
           <a:p>
@@ -11833,40 +11833,24 @@
               <a:buNone/>
             </a:pPr>
             <a:r>
-              <a:rPr lang="en-US" sz="1800" dirty="0"/>
-              <a:t>Jagdish </a:t>
-            </a:r>
-            <a:r>
-              <a:rPr lang="en-US" sz="1800" dirty="0" err="1"/>
-              <a:t>Bhagwan</a:t>
-            </a:r>
-            <a:r>
-              <a:rPr lang="en-US" sz="1800" dirty="0"/>
-              <a:t> </a:t>
-            </a:r>
-            <a:r>
-              <a:rPr lang="en-US" sz="1800" dirty="0" err="1"/>
-              <a:t>Chakole</a:t>
-            </a:r>
-            <a:r>
-              <a:rPr lang="en-US" sz="1800" dirty="0"/>
-              <a:t> et al. “A Q-learning </a:t>
-            </a:r>
-            <a:r>
-              <a:rPr lang="en-US" sz="1800" dirty="0" err="1"/>
-              <a:t>agentfor</a:t>
-            </a:r>
-            <a:r>
-              <a:rPr lang="en-US" sz="1800" dirty="0"/>
-              <a:t> automated trading in equity stock markets”. </a:t>
-            </a:r>
-            <a:r>
-              <a:rPr lang="en-US" sz="1800" dirty="0" err="1"/>
-              <a:t>In:Ex-pert</a:t>
-            </a:r>
-            <a:r>
-              <a:rPr lang="en-US" sz="1800" dirty="0"/>
-              <a:t> Systems with Applications163 (2021), p. 113761.</a:t>
+              <a:rPr lang="en-US" sz="1400" dirty="0"/>
+              <a:t>Akhil Raj </a:t>
+            </a:r>
+            <a:r>
+              <a:rPr lang="en-US" sz="1400" dirty="0" err="1"/>
+              <a:t>Azhikodan</a:t>
+            </a:r>
+            <a:r>
+              <a:rPr lang="en-US" sz="1400" dirty="0"/>
+              <a:t>, </a:t>
+            </a:r>
+            <a:r>
+              <a:rPr lang="en-US" sz="1400" dirty="0" err="1"/>
+              <a:t>Anvitha</a:t>
+            </a:r>
+            <a:r>
+              <a:rPr lang="en-US" sz="1400" dirty="0"/>
+              <a:t> G. K. Bhat, and Mamatha V. Jadhav. “Stock Trading Bot Using Deep Reinforcement Learning”. In: Innovations in Computer Science and Engineering. Springer Singapore, 2019.</a:t>
             </a:r>
           </a:p>
           <a:p>
@@ -11874,32 +11858,24 @@
               <a:buNone/>
             </a:pPr>
             <a:r>
-              <a:rPr lang="en-US" sz="1800" dirty="0"/>
-              <a:t>Marco </a:t>
-            </a:r>
-            <a:r>
-              <a:rPr lang="en-US" sz="1800" dirty="0" err="1"/>
-              <a:t>Corazza</a:t>
-            </a:r>
-            <a:r>
-              <a:rPr lang="en-US" sz="1800" dirty="0"/>
-              <a:t>. “Q-Learning-Based Financial Trad-</a:t>
-            </a:r>
-            <a:r>
-              <a:rPr lang="en-US" sz="1800" dirty="0" err="1"/>
-              <a:t>ing</a:t>
-            </a:r>
-            <a:r>
-              <a:rPr lang="en-US" sz="1800" dirty="0"/>
-              <a:t>: Some Results and Comparisons”. </a:t>
-            </a:r>
-            <a:r>
-              <a:rPr lang="en-US" sz="1800" dirty="0" err="1"/>
-              <a:t>In:Progressesin</a:t>
-            </a:r>
-            <a:r>
-              <a:rPr lang="en-US" sz="1800" dirty="0"/>
-              <a:t> Artificial Intelligence and Neural Systems. Springer,2021, pp. 343–355.</a:t>
+              <a:rPr lang="en-US" sz="1400" dirty="0"/>
+              <a:t>Jagdish </a:t>
+            </a:r>
+            <a:r>
+              <a:rPr lang="en-US" sz="1400" dirty="0" err="1"/>
+              <a:t>Bhagwan</a:t>
+            </a:r>
+            <a:r>
+              <a:rPr lang="en-US" sz="1400" dirty="0"/>
+              <a:t> </a:t>
+            </a:r>
+            <a:r>
+              <a:rPr lang="en-US" sz="1400" dirty="0" err="1"/>
+              <a:t>Chakole</a:t>
+            </a:r>
+            <a:r>
+              <a:rPr lang="en-US" sz="1400" dirty="0"/>
+              <a:t> et al. “A Q-learning agent for automated trading in equity stock markets”. In: Expert Systems with Applications 163 (2021), p. 113761. </a:t>
             </a:r>
           </a:p>
           <a:p>
@@ -11907,36 +11883,16 @@
               <a:buNone/>
             </a:pPr>
             <a:r>
-              <a:rPr lang="en-US" sz="1800" dirty="0" err="1"/>
-              <a:t>Boming</a:t>
-            </a:r>
-            <a:r>
-              <a:rPr lang="en-US" sz="1800" dirty="0"/>
-              <a:t> Huang et al. “Automated trading systems </a:t>
-            </a:r>
-            <a:r>
-              <a:rPr lang="en-US" sz="1800" dirty="0" err="1"/>
-              <a:t>sta-tistical</a:t>
-            </a:r>
-            <a:r>
-              <a:rPr lang="en-US" sz="1800" dirty="0"/>
-              <a:t> and machine learning methods and </a:t>
-            </a:r>
-            <a:r>
-              <a:rPr lang="en-US" sz="1800" dirty="0" err="1"/>
-              <a:t>hardwareimplementation</a:t>
-            </a:r>
-            <a:r>
-              <a:rPr lang="en-US" sz="1800" dirty="0"/>
-              <a:t>: a survey”. </a:t>
-            </a:r>
-            <a:r>
-              <a:rPr lang="en-US" sz="1800" dirty="0" err="1"/>
-              <a:t>In:Enterprise</a:t>
-            </a:r>
-            <a:r>
-              <a:rPr lang="en-US" sz="1800" dirty="0"/>
-              <a:t> InformationSystems13.1 (2019), pp. 132–144.</a:t>
+              <a:rPr lang="en-US" sz="1400" dirty="0"/>
+              <a:t>Marco </a:t>
+            </a:r>
+            <a:r>
+              <a:rPr lang="en-US" sz="1400" dirty="0" err="1"/>
+              <a:t>Corazza</a:t>
+            </a:r>
+            <a:r>
+              <a:rPr lang="en-US" sz="1400" dirty="0"/>
+              <a:t>. “Q-Learning-Based Financial Trading: Some Results and Comparisons”. In: Progresses in Artificial Intelligence and Neural Systems. Springer, 2021, pp. 343–355.</a:t>
             </a:r>
           </a:p>
           <a:p>
@@ -11944,16 +11900,8 @@
               <a:buNone/>
             </a:pPr>
             <a:r>
-              <a:rPr lang="en-US" sz="1800" dirty="0"/>
-              <a:t>Jae Won Lee. “Stock price prediction using reinforce-</a:t>
-            </a:r>
-            <a:r>
-              <a:rPr lang="en-US" sz="1800" dirty="0" err="1"/>
-              <a:t>ment</a:t>
-            </a:r>
-            <a:r>
-              <a:rPr lang="en-US" sz="1800" dirty="0"/>
-              <a:t> learning”. In: 1 (2001), pp. 690–695.</a:t>
+              <a:rPr lang="en-US" sz="1400" dirty="0"/>
+              <a:t>Quang-Vinh Dang. “Reinforcement Learning in Stock Trading”. In: Advanced Computational Methods for Knowledge Engineering. Cham: Springer International Publishing, 2020. </a:t>
             </a:r>
           </a:p>
           <a:p>
@@ -11961,24 +11909,12 @@
               <a:buNone/>
             </a:pPr>
             <a:r>
-              <a:rPr lang="en-US" sz="1800" dirty="0"/>
-              <a:t>Volodymyr </a:t>
-            </a:r>
-            <a:r>
-              <a:rPr lang="en-US" sz="1800" dirty="0" err="1"/>
-              <a:t>Mnih</a:t>
-            </a:r>
-            <a:r>
-              <a:rPr lang="en-US" sz="1800" dirty="0"/>
-              <a:t> et al. “Human-level control </a:t>
-            </a:r>
-            <a:r>
-              <a:rPr lang="en-US" sz="1800" dirty="0" err="1"/>
-              <a:t>throughdeep</a:t>
-            </a:r>
-            <a:r>
-              <a:rPr lang="en-US" sz="1800" dirty="0"/>
-              <a:t> reinforcement learning”. In:nature518.7540(2015), pp. 529–533.</a:t>
+              <a:rPr lang="en-US" sz="1400" dirty="0" err="1"/>
+              <a:t>Boming</a:t>
+            </a:r>
+            <a:r>
+              <a:rPr lang="en-US" sz="1400" dirty="0"/>
+              <a:t> Huang et al. “Automated trading systems statistical and machine learning methods and hardware implementation: a survey”. In: Enterprise Information Systems 13.1 (2019), pp. 132–144. </a:t>
             </a:r>
           </a:p>
           <a:p>
@@ -11986,44 +11922,8 @@
               <a:buNone/>
             </a:pPr>
             <a:r>
-              <a:rPr lang="en-US" sz="1800" dirty="0" err="1"/>
-              <a:t>Rommy</a:t>
-            </a:r>
-            <a:r>
-              <a:rPr lang="en-US" sz="1800" dirty="0"/>
-              <a:t> </a:t>
-            </a:r>
-            <a:r>
-              <a:rPr lang="en-US" sz="1800" dirty="0" err="1"/>
-              <a:t>Pramudya</a:t>
-            </a:r>
-            <a:r>
-              <a:rPr lang="en-US" sz="1800" dirty="0"/>
-              <a:t> and Sakina </a:t>
-            </a:r>
-            <a:r>
-              <a:rPr lang="en-US" sz="1800" dirty="0" err="1"/>
-              <a:t>Ichsani</a:t>
-            </a:r>
-            <a:r>
-              <a:rPr lang="en-US" sz="1800" dirty="0"/>
-              <a:t>. “Efficiency </a:t>
-            </a:r>
-            <a:r>
-              <a:rPr lang="en-US" sz="1800" dirty="0" err="1"/>
-              <a:t>oftechnical</a:t>
-            </a:r>
-            <a:r>
-              <a:rPr lang="en-US" sz="1800" dirty="0"/>
-              <a:t> analysis for the stock trading”. </a:t>
-            </a:r>
-            <a:r>
-              <a:rPr lang="en-US" sz="1800" dirty="0" err="1"/>
-              <a:t>In:Inter-national</a:t>
-            </a:r>
-            <a:r>
-              <a:rPr lang="en-US" sz="1800" dirty="0"/>
-              <a:t> Journal of Finance &amp; Banking Studies9.1(2020), pp. 58–67.</a:t>
+              <a:rPr lang="en-US" sz="1400" dirty="0"/>
+              <a:t>Jae Won Lee. “Stock price prediction using reinforcement learning”. In: 1 (2001), pp. 690–695. </a:t>
             </a:r>
           </a:p>
           <a:p>
@@ -12031,32 +11931,16 @@
               <a:buNone/>
             </a:pPr>
             <a:r>
-              <a:rPr lang="en-US" sz="1800" dirty="0"/>
-              <a:t>Melrose Roderick, James </a:t>
-            </a:r>
-            <a:r>
-              <a:rPr lang="en-US" sz="1800" dirty="0" err="1"/>
-              <a:t>MacGlashan</a:t>
-            </a:r>
-            <a:r>
-              <a:rPr lang="en-US" sz="1800" dirty="0"/>
-              <a:t>, and </a:t>
-            </a:r>
-            <a:r>
-              <a:rPr lang="en-US" sz="1800" dirty="0" err="1"/>
-              <a:t>StefanieTellex</a:t>
-            </a:r>
-            <a:r>
-              <a:rPr lang="en-US" sz="1800" dirty="0"/>
-              <a:t>. “Implementing the deep q-network”. </a:t>
-            </a:r>
-            <a:r>
-              <a:rPr lang="en-US" sz="1800" dirty="0" err="1"/>
-              <a:t>In:arXivpreprint</a:t>
-            </a:r>
-            <a:r>
-              <a:rPr lang="en-US" sz="1800" dirty="0"/>
-              <a:t> arXiv:1711.07478(2017).</a:t>
+              <a:rPr lang="en-US" sz="1400" dirty="0"/>
+              <a:t>Volodymyr </a:t>
+            </a:r>
+            <a:r>
+              <a:rPr lang="en-US" sz="1400" dirty="0" err="1"/>
+              <a:t>Mnih</a:t>
+            </a:r>
+            <a:r>
+              <a:rPr lang="en-US" sz="1400" dirty="0"/>
+              <a:t> et al. “Human-level control through deep reinforcement learning”. In: nature 518.7540 (2015), pp. 529–533. </a:t>
             </a:r>
           </a:p>
           <a:p>
@@ -12064,24 +11948,70 @@
               <a:buNone/>
             </a:pPr>
             <a:r>
-              <a:rPr lang="en-US" sz="1800" dirty="0"/>
-              <a:t>Yong Shi et al. “Stock trading rule discovery with </a:t>
-            </a:r>
-            <a:r>
-              <a:rPr lang="en-US" sz="1800" dirty="0" err="1"/>
-              <a:t>dou-ble</a:t>
-            </a:r>
-            <a:r>
-              <a:rPr lang="en-US" sz="1800" dirty="0"/>
-              <a:t> deep Q-network”. </a:t>
-            </a:r>
-            <a:r>
-              <a:rPr lang="en-US" sz="1800" dirty="0" err="1"/>
-              <a:t>In:Applied</a:t>
-            </a:r>
-            <a:r>
-              <a:rPr lang="en-US" sz="1800" dirty="0"/>
-              <a:t> Soft Computing107(2021), p. 107320.</a:t>
+              <a:rPr lang="en-US" sz="1400" dirty="0" err="1"/>
+              <a:t>Rommy</a:t>
+            </a:r>
+            <a:r>
+              <a:rPr lang="en-US" sz="1400" dirty="0"/>
+              <a:t> </a:t>
+            </a:r>
+            <a:r>
+              <a:rPr lang="en-US" sz="1400" dirty="0" err="1"/>
+              <a:t>Pramudya</a:t>
+            </a:r>
+            <a:r>
+              <a:rPr lang="en-US" sz="1400" dirty="0"/>
+              <a:t> and Sakina </a:t>
+            </a:r>
+            <a:r>
+              <a:rPr lang="en-US" sz="1400" dirty="0" err="1"/>
+              <a:t>Ichsani</a:t>
+            </a:r>
+            <a:r>
+              <a:rPr lang="en-US" sz="1400" dirty="0"/>
+              <a:t>. “Efficiency of technical analysis for the stock trading”. In: International Journal of Finance &amp; Banking Studies 9.1 (2020), pp. 58–67. </a:t>
+            </a:r>
+          </a:p>
+          <a:p>
+            <a:pPr marL="0" indent="0">
+              <a:buNone/>
+            </a:pPr>
+            <a:r>
+              <a:rPr lang="en-US" sz="1400" dirty="0"/>
+              <a:t>Melrose Roderick, James </a:t>
+            </a:r>
+            <a:r>
+              <a:rPr lang="en-US" sz="1400" dirty="0" err="1"/>
+              <a:t>MacGlashan</a:t>
+            </a:r>
+            <a:r>
+              <a:rPr lang="en-US" sz="1400" dirty="0"/>
+              <a:t>, and Stefanie </a:t>
+            </a:r>
+            <a:r>
+              <a:rPr lang="en-US" sz="1400" dirty="0" err="1"/>
+              <a:t>Tellex</a:t>
+            </a:r>
+            <a:r>
+              <a:rPr lang="en-US" sz="1400" dirty="0"/>
+              <a:t>. “Implementing the deep q-network”. In: </a:t>
+            </a:r>
+            <a:r>
+              <a:rPr lang="en-US" sz="1400" dirty="0" err="1"/>
+              <a:t>arXiv</a:t>
+            </a:r>
+            <a:r>
+              <a:rPr lang="en-US" sz="1400" dirty="0"/>
+              <a:t> preprint arXiv:1711.07478 (2017). </a:t>
+            </a:r>
+          </a:p>
+          <a:p>
+            <a:pPr marL="0" indent="0">
+              <a:buNone/>
+            </a:pPr>
+            <a:r>
+              <a:rPr lang="en-US" sz="1400" dirty="0"/>
+              <a:t>Yong Shi et al. “Stock trading rule discovery with double deep Q-network”. In: Applied Soft Computing 107 (2021), p. 107320.</a:t>
             </a:r>
           </a:p>
         </p:txBody>

</xml_diff>